<commit_message>
Ajustes na dashboard, falta terminar
</commit_message>
<xml_diff>
--- a/documentacao/Apresentacao_smartBin.pptx
+++ b/documentacao/Apresentacao_smartBin.pptx
@@ -44,6 +44,14 @@
       <p:font typeface="Nunito Light" pitchFamily="2" charset="0"/>
       <p:regular r:id="rId22"/>
       <p:italic r:id="rId23"/>
+    </p:embeddedFont>
+    <p:embeddedFont>
+      <p:font typeface="Open Sans" panose="020B0606030504020204" pitchFamily="34" charset="0"/>
+      <p:regular r:id="rId24"/>
+    </p:embeddedFont>
+    <p:embeddedFont>
+      <p:font typeface="Open Sans Bold" panose="020B0806030504020204" pitchFamily="34" charset="0"/>
+      <p:bold r:id="rId25"/>
     </p:embeddedFont>
   </p:embeddedFontLst>
   <p:defaultTextStyle>
@@ -2746,750 +2754,6 @@
 </file>
 
 <file path=ppt/slideLayouts/slideLayout10.xml><?xml version="1.0" encoding="utf-8"?>
-<p:sldLayout xmlns:a="http://schemas.openxmlformats.org/drawingml/2006/main" xmlns:r="http://schemas.openxmlformats.org/officeDocument/2006/relationships" xmlns:p="http://schemas.openxmlformats.org/presentationml/2006/main" matchingName="Title and text 1">
-  <p:cSld name="CUSTOM_4">
-    <p:spTree>
-      <p:nvGrpSpPr>
-        <p:cNvPr id="1" name="Shape 105"/>
-        <p:cNvGrpSpPr/>
-        <p:nvPr/>
-      </p:nvGrpSpPr>
-      <p:grpSpPr>
-        <a:xfrm>
-          <a:off x="0" y="0"/>
-          <a:ext cx="0" cy="0"/>
-          <a:chOff x="0" y="0"/>
-          <a:chExt cx="0" cy="0"/>
-        </a:xfrm>
-      </p:grpSpPr>
-      <p:sp>
-        <p:nvSpPr>
-          <p:cNvPr id="106" name="Google Shape;106;p17"/>
-          <p:cNvSpPr/>
-          <p:nvPr/>
-        </p:nvSpPr>
-        <p:spPr>
-          <a:xfrm rot="10800000">
-            <a:off x="7013050" y="4546600"/>
-            <a:ext cx="2143640" cy="630455"/>
-          </a:xfrm>
-          <a:custGeom>
-            <a:avLst/>
-            <a:gdLst/>
-            <a:ahLst/>
-            <a:cxnLst/>
-            <a:rect l="l" t="t" r="r" b="b"/>
-            <a:pathLst>
-              <a:path w="123731" h="48590" extrusionOk="0">
-                <a:moveTo>
-                  <a:pt x="123731" y="0"/>
-                </a:moveTo>
-                <a:cubicBezTo>
-                  <a:pt x="122673" y="6289"/>
-                  <a:pt x="120118" y="12317"/>
-                  <a:pt x="116205" y="17368"/>
-                </a:cubicBezTo>
-                <a:cubicBezTo>
-                  <a:pt x="108479" y="27310"/>
-                  <a:pt x="95683" y="33079"/>
-                  <a:pt x="83106" y="32260"/>
-                </a:cubicBezTo>
-                <a:cubicBezTo>
-                  <a:pt x="81769" y="32180"/>
-                  <a:pt x="80431" y="32021"/>
-                  <a:pt x="79074" y="31841"/>
-                </a:cubicBezTo>
-                <a:cubicBezTo>
-                  <a:pt x="72027" y="30903"/>
-                  <a:pt x="64840" y="29166"/>
-                  <a:pt x="58512" y="32121"/>
-                </a:cubicBezTo>
-                <a:cubicBezTo>
-                  <a:pt x="53122" y="34616"/>
-                  <a:pt x="49688" y="39986"/>
-                  <a:pt x="44837" y="43400"/>
-                </a:cubicBezTo>
-                <a:cubicBezTo>
-                  <a:pt x="38489" y="47851"/>
-                  <a:pt x="29945" y="48590"/>
-                  <a:pt x="22579" y="46214"/>
-                </a:cubicBezTo>
-                <a:cubicBezTo>
-                  <a:pt x="15192" y="43839"/>
-                  <a:pt x="8944" y="38609"/>
-                  <a:pt x="4372" y="32340"/>
-                </a:cubicBezTo>
-                <a:cubicBezTo>
-                  <a:pt x="2795" y="30184"/>
-                  <a:pt x="1398" y="27888"/>
-                  <a:pt x="0" y="25573"/>
-                </a:cubicBezTo>
-                <a:lnTo>
-                  <a:pt x="0" y="0"/>
-                </a:lnTo>
-                <a:close/>
-              </a:path>
-            </a:pathLst>
-          </a:custGeom>
-          <a:solidFill>
-            <a:schemeClr val="lt2"/>
-          </a:solidFill>
-          <a:ln>
-            <a:noFill/>
-          </a:ln>
-        </p:spPr>
-        <p:txBody>
-          <a:bodyPr spcFirstLastPara="1" wrap="square" lIns="91425" tIns="91425" rIns="91425" bIns="91425" anchor="ctr" anchorCtr="0">
-            <a:noAutofit/>
-          </a:bodyPr>
-          <a:lstStyle/>
-          <a:p>
-            <a:pPr marL="0" lvl="0" indent="0" algn="l" rtl="0">
-              <a:spcBef>
-                <a:spcPts val="0"/>
-              </a:spcBef>
-              <a:spcAft>
-                <a:spcPts val="0"/>
-              </a:spcAft>
-              <a:buNone/>
-            </a:pPr>
-            <a:endParaRPr/>
-          </a:p>
-        </p:txBody>
-      </p:sp>
-      <p:sp>
-        <p:nvSpPr>
-          <p:cNvPr id="107" name="Google Shape;107;p17"/>
-          <p:cNvSpPr txBox="1">
-            <a:spLocks noGrp="1"/>
-          </p:cNvSpPr>
-          <p:nvPr>
-            <p:ph type="title"/>
-          </p:nvPr>
-        </p:nvSpPr>
-        <p:spPr>
-          <a:xfrm>
-            <a:off x="720000" y="2942000"/>
-            <a:ext cx="4180500" cy="694800"/>
-          </a:xfrm>
-          <a:prstGeom prst="rect">
-            <a:avLst/>
-          </a:prstGeom>
-        </p:spPr>
-        <p:txBody>
-          <a:bodyPr spcFirstLastPara="1" wrap="square" lIns="91425" tIns="91425" rIns="91425" bIns="91425" anchor="b" anchorCtr="0">
-            <a:noAutofit/>
-          </a:bodyPr>
-          <a:lstStyle>
-            <a:lvl1pPr lvl="0" rtl="0">
-              <a:spcBef>
-                <a:spcPts val="0"/>
-              </a:spcBef>
-              <a:spcAft>
-                <a:spcPts val="0"/>
-              </a:spcAft>
-              <a:buSzPts val="3500"/>
-              <a:buNone/>
-              <a:defRPr/>
-            </a:lvl1pPr>
-            <a:lvl2pPr lvl="1" rtl="0">
-              <a:spcBef>
-                <a:spcPts val="0"/>
-              </a:spcBef>
-              <a:spcAft>
-                <a:spcPts val="0"/>
-              </a:spcAft>
-              <a:buSzPts val="3500"/>
-              <a:buNone/>
-              <a:defRPr/>
-            </a:lvl2pPr>
-            <a:lvl3pPr lvl="2" rtl="0">
-              <a:spcBef>
-                <a:spcPts val="0"/>
-              </a:spcBef>
-              <a:spcAft>
-                <a:spcPts val="0"/>
-              </a:spcAft>
-              <a:buSzPts val="3500"/>
-              <a:buNone/>
-              <a:defRPr/>
-            </a:lvl3pPr>
-            <a:lvl4pPr lvl="3" rtl="0">
-              <a:spcBef>
-                <a:spcPts val="0"/>
-              </a:spcBef>
-              <a:spcAft>
-                <a:spcPts val="0"/>
-              </a:spcAft>
-              <a:buSzPts val="3500"/>
-              <a:buNone/>
-              <a:defRPr/>
-            </a:lvl4pPr>
-            <a:lvl5pPr lvl="4" rtl="0">
-              <a:spcBef>
-                <a:spcPts val="0"/>
-              </a:spcBef>
-              <a:spcAft>
-                <a:spcPts val="0"/>
-              </a:spcAft>
-              <a:buSzPts val="3500"/>
-              <a:buNone/>
-              <a:defRPr/>
-            </a:lvl5pPr>
-            <a:lvl6pPr lvl="5" rtl="0">
-              <a:spcBef>
-                <a:spcPts val="0"/>
-              </a:spcBef>
-              <a:spcAft>
-                <a:spcPts val="0"/>
-              </a:spcAft>
-              <a:buSzPts val="3500"/>
-              <a:buNone/>
-              <a:defRPr/>
-            </a:lvl6pPr>
-            <a:lvl7pPr lvl="6" rtl="0">
-              <a:spcBef>
-                <a:spcPts val="0"/>
-              </a:spcBef>
-              <a:spcAft>
-                <a:spcPts val="0"/>
-              </a:spcAft>
-              <a:buSzPts val="3500"/>
-              <a:buNone/>
-              <a:defRPr/>
-            </a:lvl7pPr>
-            <a:lvl8pPr lvl="7" rtl="0">
-              <a:spcBef>
-                <a:spcPts val="0"/>
-              </a:spcBef>
-              <a:spcAft>
-                <a:spcPts val="0"/>
-              </a:spcAft>
-              <a:buSzPts val="3500"/>
-              <a:buNone/>
-              <a:defRPr/>
-            </a:lvl8pPr>
-            <a:lvl9pPr lvl="8" rtl="0">
-              <a:spcBef>
-                <a:spcPts val="0"/>
-              </a:spcBef>
-              <a:spcAft>
-                <a:spcPts val="0"/>
-              </a:spcAft>
-              <a:buSzPts val="3500"/>
-              <a:buNone/>
-              <a:defRPr/>
-            </a:lvl9pPr>
-          </a:lstStyle>
-          <a:p>
-            <a:endParaRPr/>
-          </a:p>
-        </p:txBody>
-      </p:sp>
-      <p:sp>
-        <p:nvSpPr>
-          <p:cNvPr id="108" name="Google Shape;108;p17"/>
-          <p:cNvSpPr txBox="1">
-            <a:spLocks noGrp="1"/>
-          </p:cNvSpPr>
-          <p:nvPr>
-            <p:ph type="subTitle" idx="1"/>
-          </p:nvPr>
-        </p:nvSpPr>
-        <p:spPr>
-          <a:xfrm>
-            <a:off x="720000" y="3636800"/>
-            <a:ext cx="4180500" cy="967200"/>
-          </a:xfrm>
-          <a:prstGeom prst="rect">
-            <a:avLst/>
-          </a:prstGeom>
-        </p:spPr>
-        <p:txBody>
-          <a:bodyPr spcFirstLastPara="1" wrap="square" lIns="91425" tIns="91425" rIns="91425" bIns="91425" anchor="t" anchorCtr="0">
-            <a:noAutofit/>
-          </a:bodyPr>
-          <a:lstStyle>
-            <a:lvl1pPr lvl="0" rtl="0">
-              <a:spcBef>
-                <a:spcPts val="0"/>
-              </a:spcBef>
-              <a:spcAft>
-                <a:spcPts val="0"/>
-              </a:spcAft>
-              <a:buSzPts val="1400"/>
-              <a:buNone/>
-              <a:defRPr/>
-            </a:lvl1pPr>
-            <a:lvl2pPr lvl="1" algn="ctr" rtl="0">
-              <a:lnSpc>
-                <a:spcPct val="100000"/>
-              </a:lnSpc>
-              <a:spcBef>
-                <a:spcPts val="0"/>
-              </a:spcBef>
-              <a:spcAft>
-                <a:spcPts val="0"/>
-              </a:spcAft>
-              <a:buSzPts val="1400"/>
-              <a:buNone/>
-              <a:defRPr/>
-            </a:lvl2pPr>
-            <a:lvl3pPr lvl="2" algn="ctr" rtl="0">
-              <a:lnSpc>
-                <a:spcPct val="100000"/>
-              </a:lnSpc>
-              <a:spcBef>
-                <a:spcPts val="0"/>
-              </a:spcBef>
-              <a:spcAft>
-                <a:spcPts val="0"/>
-              </a:spcAft>
-              <a:buSzPts val="1400"/>
-              <a:buNone/>
-              <a:defRPr/>
-            </a:lvl3pPr>
-            <a:lvl4pPr lvl="3" algn="ctr" rtl="0">
-              <a:lnSpc>
-                <a:spcPct val="100000"/>
-              </a:lnSpc>
-              <a:spcBef>
-                <a:spcPts val="0"/>
-              </a:spcBef>
-              <a:spcAft>
-                <a:spcPts val="0"/>
-              </a:spcAft>
-              <a:buSzPts val="1400"/>
-              <a:buNone/>
-              <a:defRPr/>
-            </a:lvl4pPr>
-            <a:lvl5pPr lvl="4" algn="ctr" rtl="0">
-              <a:lnSpc>
-                <a:spcPct val="100000"/>
-              </a:lnSpc>
-              <a:spcBef>
-                <a:spcPts val="0"/>
-              </a:spcBef>
-              <a:spcAft>
-                <a:spcPts val="0"/>
-              </a:spcAft>
-              <a:buSzPts val="1400"/>
-              <a:buNone/>
-              <a:defRPr/>
-            </a:lvl5pPr>
-            <a:lvl6pPr lvl="5" algn="ctr" rtl="0">
-              <a:lnSpc>
-                <a:spcPct val="100000"/>
-              </a:lnSpc>
-              <a:spcBef>
-                <a:spcPts val="0"/>
-              </a:spcBef>
-              <a:spcAft>
-                <a:spcPts val="0"/>
-              </a:spcAft>
-              <a:buSzPts val="1400"/>
-              <a:buNone/>
-              <a:defRPr/>
-            </a:lvl6pPr>
-            <a:lvl7pPr lvl="6" algn="ctr" rtl="0">
-              <a:lnSpc>
-                <a:spcPct val="100000"/>
-              </a:lnSpc>
-              <a:spcBef>
-                <a:spcPts val="0"/>
-              </a:spcBef>
-              <a:spcAft>
-                <a:spcPts val="0"/>
-              </a:spcAft>
-              <a:buSzPts val="1400"/>
-              <a:buNone/>
-              <a:defRPr/>
-            </a:lvl7pPr>
-            <a:lvl8pPr lvl="7" algn="ctr" rtl="0">
-              <a:lnSpc>
-                <a:spcPct val="100000"/>
-              </a:lnSpc>
-              <a:spcBef>
-                <a:spcPts val="0"/>
-              </a:spcBef>
-              <a:spcAft>
-                <a:spcPts val="0"/>
-              </a:spcAft>
-              <a:buSzPts val="1400"/>
-              <a:buNone/>
-              <a:defRPr/>
-            </a:lvl8pPr>
-            <a:lvl9pPr lvl="8" algn="ctr" rtl="0">
-              <a:lnSpc>
-                <a:spcPct val="100000"/>
-              </a:lnSpc>
-              <a:spcBef>
-                <a:spcPts val="0"/>
-              </a:spcBef>
-              <a:spcAft>
-                <a:spcPts val="0"/>
-              </a:spcAft>
-              <a:buSzPts val="1400"/>
-              <a:buNone/>
-              <a:defRPr/>
-            </a:lvl9pPr>
-          </a:lstStyle>
-          <a:p>
-            <a:endParaRPr/>
-          </a:p>
-        </p:txBody>
-      </p:sp>
-      <p:grpSp>
-        <p:nvGrpSpPr>
-          <p:cNvPr id="109" name="Google Shape;109;p17"/>
-          <p:cNvGrpSpPr/>
-          <p:nvPr/>
-        </p:nvGrpSpPr>
-        <p:grpSpPr>
-          <a:xfrm rot="478948">
-            <a:off x="7779090" y="4614186"/>
-            <a:ext cx="160368" cy="193469"/>
-            <a:chOff x="1096838" y="391396"/>
-            <a:chExt cx="245538" cy="296218"/>
-          </a:xfrm>
-        </p:grpSpPr>
-        <p:sp>
-          <p:nvSpPr>
-            <p:cNvPr id="110" name="Google Shape;110;p17"/>
-            <p:cNvSpPr/>
-            <p:nvPr/>
-          </p:nvSpPr>
-          <p:spPr>
-            <a:xfrm>
-              <a:off x="1096838" y="391396"/>
-              <a:ext cx="245538" cy="296218"/>
-            </a:xfrm>
-            <a:custGeom>
-              <a:avLst/>
-              <a:gdLst/>
-              <a:ahLst/>
-              <a:cxnLst/>
-              <a:rect l="l" t="t" r="r" b="b"/>
-              <a:pathLst>
-                <a:path w="5620" h="6780" extrusionOk="0">
-                  <a:moveTo>
-                    <a:pt x="2259" y="1"/>
-                  </a:moveTo>
-                  <a:cubicBezTo>
-                    <a:pt x="2201" y="1"/>
-                    <a:pt x="2143" y="42"/>
-                    <a:pt x="2153" y="116"/>
-                  </a:cubicBezTo>
-                  <a:cubicBezTo>
-                    <a:pt x="2272" y="930"/>
-                    <a:pt x="2257" y="1818"/>
-                    <a:pt x="1847" y="2554"/>
-                  </a:cubicBezTo>
-                  <a:cubicBezTo>
-                    <a:pt x="1495" y="3189"/>
-                    <a:pt x="848" y="3674"/>
-                    <a:pt x="107" y="3687"/>
-                  </a:cubicBezTo>
-                  <a:cubicBezTo>
-                    <a:pt x="20" y="3689"/>
-                    <a:pt x="1" y="3774"/>
-                    <a:pt x="34" y="3836"/>
-                  </a:cubicBezTo>
-                  <a:cubicBezTo>
-                    <a:pt x="19" y="3899"/>
-                    <a:pt x="62" y="3982"/>
-                    <a:pt x="146" y="3982"/>
-                  </a:cubicBezTo>
-                  <a:cubicBezTo>
-                    <a:pt x="147" y="3982"/>
-                    <a:pt x="148" y="3982"/>
-                    <a:pt x="148" y="3982"/>
-                  </a:cubicBezTo>
-                  <a:cubicBezTo>
-                    <a:pt x="249" y="3979"/>
-                    <a:pt x="351" y="3977"/>
-                    <a:pt x="453" y="3977"/>
-                  </a:cubicBezTo>
-                  <a:cubicBezTo>
-                    <a:pt x="720" y="3977"/>
-                    <a:pt x="989" y="3993"/>
-                    <a:pt x="1248" y="4058"/>
-                  </a:cubicBezTo>
-                  <a:cubicBezTo>
-                    <a:pt x="1603" y="4149"/>
-                    <a:pt x="1901" y="4350"/>
-                    <a:pt x="2126" y="4637"/>
-                  </a:cubicBezTo>
-                  <a:cubicBezTo>
-                    <a:pt x="2599" y="5240"/>
-                    <a:pt x="2713" y="6028"/>
-                    <a:pt x="3026" y="6713"/>
-                  </a:cubicBezTo>
-                  <a:cubicBezTo>
-                    <a:pt x="3034" y="6733"/>
-                    <a:pt x="3046" y="6745"/>
-                    <a:pt x="3061" y="6755"/>
-                  </a:cubicBezTo>
-                  <a:cubicBezTo>
-                    <a:pt x="3079" y="6772"/>
-                    <a:pt x="3103" y="6780"/>
-                    <a:pt x="3128" y="6780"/>
-                  </a:cubicBezTo>
-                  <a:cubicBezTo>
-                    <a:pt x="3186" y="6780"/>
-                    <a:pt x="3248" y="6738"/>
-                    <a:pt x="3243" y="6663"/>
-                  </a:cubicBezTo>
-                  <a:cubicBezTo>
-                    <a:pt x="3196" y="5884"/>
-                    <a:pt x="3194" y="5037"/>
-                    <a:pt x="3637" y="4360"/>
-                  </a:cubicBezTo>
-                  <a:cubicBezTo>
-                    <a:pt x="4063" y="3706"/>
-                    <a:pt x="4799" y="3517"/>
-                    <a:pt x="5519" y="3367"/>
-                  </a:cubicBezTo>
-                  <a:cubicBezTo>
-                    <a:pt x="5600" y="3349"/>
-                    <a:pt x="5619" y="3265"/>
-                    <a:pt x="5594" y="3208"/>
-                  </a:cubicBezTo>
-                  <a:cubicBezTo>
-                    <a:pt x="5608" y="3151"/>
-                    <a:pt x="5584" y="3086"/>
-                    <a:pt x="5508" y="3084"/>
-                  </a:cubicBezTo>
-                  <a:cubicBezTo>
-                    <a:pt x="4752" y="3067"/>
-                    <a:pt x="3924" y="2962"/>
-                    <a:pt x="3351" y="2418"/>
-                  </a:cubicBezTo>
-                  <a:cubicBezTo>
-                    <a:pt x="2720" y="1820"/>
-                    <a:pt x="2545" y="921"/>
-                    <a:pt x="2387" y="104"/>
-                  </a:cubicBezTo>
-                  <a:cubicBezTo>
-                    <a:pt x="2380" y="69"/>
-                    <a:pt x="2361" y="45"/>
-                    <a:pt x="2336" y="32"/>
-                  </a:cubicBezTo>
-                  <a:cubicBezTo>
-                    <a:pt x="2316" y="11"/>
-                    <a:pt x="2287" y="1"/>
-                    <a:pt x="2259" y="1"/>
-                  </a:cubicBezTo>
-                  <a:close/>
-                </a:path>
-              </a:pathLst>
-            </a:custGeom>
-            <a:solidFill>
-              <a:schemeClr val="accent4"/>
-            </a:solidFill>
-            <a:ln w="76200" cap="flat" cmpd="sng">
-              <a:solidFill>
-                <a:schemeClr val="accent6"/>
-              </a:solidFill>
-              <a:prstDash val="solid"/>
-              <a:round/>
-              <a:headEnd type="none" w="sm" len="sm"/>
-              <a:tailEnd type="none" w="sm" len="sm"/>
-            </a:ln>
-            <a:effectLst>
-              <a:outerShdw dist="28575" dir="2400000" algn="bl" rotWithShape="0">
-                <a:schemeClr val="dk1">
-                  <a:alpha val="60000"/>
-                </a:schemeClr>
-              </a:outerShdw>
-            </a:effectLst>
-          </p:spPr>
-          <p:txBody>
-            <a:bodyPr spcFirstLastPara="1" wrap="square" lIns="91425" tIns="91425" rIns="91425" bIns="91425" anchor="ctr" anchorCtr="0">
-              <a:noAutofit/>
-            </a:bodyPr>
-            <a:lstStyle/>
-            <a:p>
-              <a:pPr marL="0" lvl="0" indent="0" algn="l" rtl="0">
-                <a:spcBef>
-                  <a:spcPts val="0"/>
-                </a:spcBef>
-                <a:spcAft>
-                  <a:spcPts val="0"/>
-                </a:spcAft>
-                <a:buNone/>
-              </a:pPr>
-              <a:endParaRPr/>
-            </a:p>
-          </p:txBody>
-        </p:sp>
-        <p:sp>
-          <p:nvSpPr>
-            <p:cNvPr id="111" name="Google Shape;111;p17"/>
-            <p:cNvSpPr/>
-            <p:nvPr/>
-          </p:nvSpPr>
-          <p:spPr>
-            <a:xfrm>
-              <a:off x="1096838" y="391396"/>
-              <a:ext cx="245538" cy="296218"/>
-            </a:xfrm>
-            <a:custGeom>
-              <a:avLst/>
-              <a:gdLst/>
-              <a:ahLst/>
-              <a:cxnLst/>
-              <a:rect l="l" t="t" r="r" b="b"/>
-              <a:pathLst>
-                <a:path w="5620" h="6780" extrusionOk="0">
-                  <a:moveTo>
-                    <a:pt x="2259" y="1"/>
-                  </a:moveTo>
-                  <a:cubicBezTo>
-                    <a:pt x="2201" y="1"/>
-                    <a:pt x="2143" y="42"/>
-                    <a:pt x="2153" y="116"/>
-                  </a:cubicBezTo>
-                  <a:cubicBezTo>
-                    <a:pt x="2272" y="930"/>
-                    <a:pt x="2257" y="1818"/>
-                    <a:pt x="1847" y="2554"/>
-                  </a:cubicBezTo>
-                  <a:cubicBezTo>
-                    <a:pt x="1495" y="3189"/>
-                    <a:pt x="848" y="3674"/>
-                    <a:pt x="107" y="3687"/>
-                  </a:cubicBezTo>
-                  <a:cubicBezTo>
-                    <a:pt x="20" y="3689"/>
-                    <a:pt x="1" y="3774"/>
-                    <a:pt x="34" y="3836"/>
-                  </a:cubicBezTo>
-                  <a:cubicBezTo>
-                    <a:pt x="19" y="3899"/>
-                    <a:pt x="62" y="3982"/>
-                    <a:pt x="146" y="3982"/>
-                  </a:cubicBezTo>
-                  <a:cubicBezTo>
-                    <a:pt x="147" y="3982"/>
-                    <a:pt x="148" y="3982"/>
-                    <a:pt x="148" y="3982"/>
-                  </a:cubicBezTo>
-                  <a:cubicBezTo>
-                    <a:pt x="249" y="3979"/>
-                    <a:pt x="351" y="3977"/>
-                    <a:pt x="453" y="3977"/>
-                  </a:cubicBezTo>
-                  <a:cubicBezTo>
-                    <a:pt x="720" y="3977"/>
-                    <a:pt x="989" y="3993"/>
-                    <a:pt x="1248" y="4058"/>
-                  </a:cubicBezTo>
-                  <a:cubicBezTo>
-                    <a:pt x="1603" y="4149"/>
-                    <a:pt x="1901" y="4350"/>
-                    <a:pt x="2126" y="4637"/>
-                  </a:cubicBezTo>
-                  <a:cubicBezTo>
-                    <a:pt x="2599" y="5240"/>
-                    <a:pt x="2713" y="6028"/>
-                    <a:pt x="3026" y="6713"/>
-                  </a:cubicBezTo>
-                  <a:cubicBezTo>
-                    <a:pt x="3034" y="6733"/>
-                    <a:pt x="3046" y="6745"/>
-                    <a:pt x="3061" y="6755"/>
-                  </a:cubicBezTo>
-                  <a:cubicBezTo>
-                    <a:pt x="3079" y="6772"/>
-                    <a:pt x="3103" y="6780"/>
-                    <a:pt x="3128" y="6780"/>
-                  </a:cubicBezTo>
-                  <a:cubicBezTo>
-                    <a:pt x="3186" y="6780"/>
-                    <a:pt x="3248" y="6738"/>
-                    <a:pt x="3243" y="6663"/>
-                  </a:cubicBezTo>
-                  <a:cubicBezTo>
-                    <a:pt x="3196" y="5884"/>
-                    <a:pt x="3194" y="5037"/>
-                    <a:pt x="3637" y="4360"/>
-                  </a:cubicBezTo>
-                  <a:cubicBezTo>
-                    <a:pt x="4063" y="3706"/>
-                    <a:pt x="4799" y="3517"/>
-                    <a:pt x="5519" y="3367"/>
-                  </a:cubicBezTo>
-                  <a:cubicBezTo>
-                    <a:pt x="5600" y="3349"/>
-                    <a:pt x="5619" y="3265"/>
-                    <a:pt x="5594" y="3208"/>
-                  </a:cubicBezTo>
-                  <a:cubicBezTo>
-                    <a:pt x="5608" y="3151"/>
-                    <a:pt x="5584" y="3086"/>
-                    <a:pt x="5508" y="3084"/>
-                  </a:cubicBezTo>
-                  <a:cubicBezTo>
-                    <a:pt x="4752" y="3067"/>
-                    <a:pt x="3924" y="2962"/>
-                    <a:pt x="3351" y="2418"/>
-                  </a:cubicBezTo>
-                  <a:cubicBezTo>
-                    <a:pt x="2720" y="1820"/>
-                    <a:pt x="2545" y="921"/>
-                    <a:pt x="2387" y="104"/>
-                  </a:cubicBezTo>
-                  <a:cubicBezTo>
-                    <a:pt x="2380" y="69"/>
-                    <a:pt x="2361" y="45"/>
-                    <a:pt x="2336" y="32"/>
-                  </a:cubicBezTo>
-                  <a:cubicBezTo>
-                    <a:pt x="2316" y="11"/>
-                    <a:pt x="2287" y="1"/>
-                    <a:pt x="2259" y="1"/>
-                  </a:cubicBezTo>
-                  <a:close/>
-                </a:path>
-              </a:pathLst>
-            </a:custGeom>
-            <a:solidFill>
-              <a:schemeClr val="accent2"/>
-            </a:solidFill>
-            <a:ln>
-              <a:noFill/>
-            </a:ln>
-          </p:spPr>
-          <p:txBody>
-            <a:bodyPr spcFirstLastPara="1" wrap="square" lIns="91425" tIns="91425" rIns="91425" bIns="91425" anchor="ctr" anchorCtr="0">
-              <a:noAutofit/>
-            </a:bodyPr>
-            <a:lstStyle/>
-            <a:p>
-              <a:pPr marL="0" lvl="0" indent="0" algn="l" rtl="0">
-                <a:spcBef>
-                  <a:spcPts val="0"/>
-                </a:spcBef>
-                <a:spcAft>
-                  <a:spcPts val="0"/>
-                </a:spcAft>
-                <a:buNone/>
-              </a:pPr>
-              <a:endParaRPr/>
-            </a:p>
-          </p:txBody>
-        </p:sp>
-      </p:grpSp>
-    </p:spTree>
-  </p:cSld>
-  <p:clrMapOvr>
-    <a:masterClrMapping/>
-  </p:clrMapOvr>
-</p:sldLayout>
-</file>
-
-<file path=ppt/slideLayouts/slideLayout11.xml><?xml version="1.0" encoding="utf-8"?>
 <p:sldLayout xmlns:a="http://schemas.openxmlformats.org/drawingml/2006/main" xmlns:r="http://schemas.openxmlformats.org/officeDocument/2006/relationships" xmlns:p="http://schemas.openxmlformats.org/presentationml/2006/main" matchingName="Title and text 2">
   <p:cSld name="CUSTOM_4_1">
     <p:spTree>
@@ -4189,7 +3453,7 @@
 </p:sldLayout>
 </file>
 
-<file path=ppt/slideLayouts/slideLayout12.xml><?xml version="1.0" encoding="utf-8"?>
+<file path=ppt/slideLayouts/slideLayout11.xml><?xml version="1.0" encoding="utf-8"?>
 <p:sldLayout xmlns:a="http://schemas.openxmlformats.org/drawingml/2006/main" xmlns:r="http://schemas.openxmlformats.org/officeDocument/2006/relationships" xmlns:p="http://schemas.openxmlformats.org/presentationml/2006/main" matchingName="Title and two columns 3">
   <p:cSld name="TITLE_AND_TWO_COLUMNS_1_1">
     <p:spTree>
@@ -5090,7 +4354,7 @@
 </p:sldLayout>
 </file>
 
-<file path=ppt/slideLayouts/slideLayout13.xml><?xml version="1.0" encoding="utf-8"?>
+<file path=ppt/slideLayouts/slideLayout12.xml><?xml version="1.0" encoding="utf-8"?>
 <p:sldLayout xmlns:a="http://schemas.openxmlformats.org/drawingml/2006/main" xmlns:r="http://schemas.openxmlformats.org/officeDocument/2006/relationships" xmlns:p="http://schemas.openxmlformats.org/presentationml/2006/main" matchingName="Title and three columns">
   <p:cSld name="CUSTOM_6">
     <p:spTree>
@@ -6735,7 +5999,7 @@
 </p:sldLayout>
 </file>
 
-<file path=ppt/slideLayouts/slideLayout14.xml><?xml version="1.0" encoding="utf-8"?>
+<file path=ppt/slideLayouts/slideLayout13.xml><?xml version="1.0" encoding="utf-8"?>
 <p:sldLayout xmlns:a="http://schemas.openxmlformats.org/drawingml/2006/main" xmlns:r="http://schemas.openxmlformats.org/officeDocument/2006/relationships" xmlns:p="http://schemas.openxmlformats.org/presentationml/2006/main" matchingName="Thanks">
   <p:cSld name="CUSTOM_3_1">
     <p:spTree>
@@ -7746,7 +7010,7 @@
 </p:sldLayout>
 </file>
 
-<file path=ppt/slideLayouts/slideLayout15.xml><?xml version="1.0" encoding="utf-8"?>
+<file path=ppt/slideLayouts/slideLayout14.xml><?xml version="1.0" encoding="utf-8"?>
 <p:sldLayout xmlns:a="http://schemas.openxmlformats.org/drawingml/2006/main" xmlns:r="http://schemas.openxmlformats.org/officeDocument/2006/relationships" xmlns:p="http://schemas.openxmlformats.org/presentationml/2006/main" matchingName="Background">
   <p:cSld name="CUSTOM_9">
     <p:spTree>
@@ -8296,7 +7560,7 @@
 </p:sldLayout>
 </file>
 
-<file path=ppt/slideLayouts/slideLayout16.xml><?xml version="1.0" encoding="utf-8"?>
+<file path=ppt/slideLayouts/slideLayout15.xml><?xml version="1.0" encoding="utf-8"?>
 <p:sldLayout xmlns:a="http://schemas.openxmlformats.org/drawingml/2006/main" xmlns:r="http://schemas.openxmlformats.org/officeDocument/2006/relationships" xmlns:p="http://schemas.openxmlformats.org/presentationml/2006/main" matchingName="Background 1">
   <p:cSld name="CUSTOM_9_1">
     <p:spTree>
@@ -11980,39 +11244,6 @@
 </file>
 
 <file path=ppt/slideLayouts/slideLayout7.xml><?xml version="1.0" encoding="utf-8"?>
-<p:sldLayout xmlns:a="http://schemas.openxmlformats.org/drawingml/2006/main" xmlns:r="http://schemas.openxmlformats.org/officeDocument/2006/relationships" xmlns:p="http://schemas.openxmlformats.org/presentationml/2006/main" matchingName="Blank" type="blank">
-  <p:cSld name="BLANK">
-    <p:bg>
-      <p:bgPr>
-        <a:solidFill>
-          <a:schemeClr val="accent6"/>
-        </a:solidFill>
-        <a:effectLst/>
-      </p:bgPr>
-    </p:bg>
-    <p:spTree>
-      <p:nvGrpSpPr>
-        <p:cNvPr id="1" name="Shape 70"/>
-        <p:cNvGrpSpPr/>
-        <p:nvPr/>
-      </p:nvGrpSpPr>
-      <p:grpSpPr>
-        <a:xfrm>
-          <a:off x="0" y="0"/>
-          <a:ext cx="0" cy="0"/>
-          <a:chOff x="0" y="0"/>
-          <a:chExt cx="0" cy="0"/>
-        </a:xfrm>
-      </p:grpSpPr>
-    </p:spTree>
-  </p:cSld>
-  <p:clrMapOvr>
-    <a:masterClrMapping/>
-  </p:clrMapOvr>
-</p:sldLayout>
-</file>
-
-<file path=ppt/slideLayouts/slideLayout8.xml><?xml version="1.0" encoding="utf-8"?>
 <p:sldLayout xmlns:a="http://schemas.openxmlformats.org/drawingml/2006/main" xmlns:r="http://schemas.openxmlformats.org/officeDocument/2006/relationships" xmlns:p="http://schemas.openxmlformats.org/presentationml/2006/main" matchingName="Title only 1">
   <p:cSld name="CUSTOM_10">
     <p:spTree>
@@ -13044,7 +12275,7 @@
 </p:sldLayout>
 </file>
 
-<file path=ppt/slideLayouts/slideLayout9.xml><?xml version="1.0" encoding="utf-8"?>
+<file path=ppt/slideLayouts/slideLayout8.xml><?xml version="1.0" encoding="utf-8"?>
 <p:sldLayout xmlns:a="http://schemas.openxmlformats.org/drawingml/2006/main" xmlns:r="http://schemas.openxmlformats.org/officeDocument/2006/relationships" xmlns:p="http://schemas.openxmlformats.org/presentationml/2006/main" matchingName="Title and text">
   <p:cSld name="CUSTOM">
     <p:spTree>
@@ -13478,6 +12709,750 @@
 </p:sldLayout>
 </file>
 
+<file path=ppt/slideLayouts/slideLayout9.xml><?xml version="1.0" encoding="utf-8"?>
+<p:sldLayout xmlns:a="http://schemas.openxmlformats.org/drawingml/2006/main" xmlns:r="http://schemas.openxmlformats.org/officeDocument/2006/relationships" xmlns:p="http://schemas.openxmlformats.org/presentationml/2006/main" matchingName="Title and text 1">
+  <p:cSld name="CUSTOM_4">
+    <p:spTree>
+      <p:nvGrpSpPr>
+        <p:cNvPr id="1" name="Shape 105"/>
+        <p:cNvGrpSpPr/>
+        <p:nvPr/>
+      </p:nvGrpSpPr>
+      <p:grpSpPr>
+        <a:xfrm>
+          <a:off x="0" y="0"/>
+          <a:ext cx="0" cy="0"/>
+          <a:chOff x="0" y="0"/>
+          <a:chExt cx="0" cy="0"/>
+        </a:xfrm>
+      </p:grpSpPr>
+      <p:sp>
+        <p:nvSpPr>
+          <p:cNvPr id="106" name="Google Shape;106;p17"/>
+          <p:cNvSpPr/>
+          <p:nvPr/>
+        </p:nvSpPr>
+        <p:spPr>
+          <a:xfrm rot="10800000">
+            <a:off x="7013050" y="4546600"/>
+            <a:ext cx="2143640" cy="630455"/>
+          </a:xfrm>
+          <a:custGeom>
+            <a:avLst/>
+            <a:gdLst/>
+            <a:ahLst/>
+            <a:cxnLst/>
+            <a:rect l="l" t="t" r="r" b="b"/>
+            <a:pathLst>
+              <a:path w="123731" h="48590" extrusionOk="0">
+                <a:moveTo>
+                  <a:pt x="123731" y="0"/>
+                </a:moveTo>
+                <a:cubicBezTo>
+                  <a:pt x="122673" y="6289"/>
+                  <a:pt x="120118" y="12317"/>
+                  <a:pt x="116205" y="17368"/>
+                </a:cubicBezTo>
+                <a:cubicBezTo>
+                  <a:pt x="108479" y="27310"/>
+                  <a:pt x="95683" y="33079"/>
+                  <a:pt x="83106" y="32260"/>
+                </a:cubicBezTo>
+                <a:cubicBezTo>
+                  <a:pt x="81769" y="32180"/>
+                  <a:pt x="80431" y="32021"/>
+                  <a:pt x="79074" y="31841"/>
+                </a:cubicBezTo>
+                <a:cubicBezTo>
+                  <a:pt x="72027" y="30903"/>
+                  <a:pt x="64840" y="29166"/>
+                  <a:pt x="58512" y="32121"/>
+                </a:cubicBezTo>
+                <a:cubicBezTo>
+                  <a:pt x="53122" y="34616"/>
+                  <a:pt x="49688" y="39986"/>
+                  <a:pt x="44837" y="43400"/>
+                </a:cubicBezTo>
+                <a:cubicBezTo>
+                  <a:pt x="38489" y="47851"/>
+                  <a:pt x="29945" y="48590"/>
+                  <a:pt x="22579" y="46214"/>
+                </a:cubicBezTo>
+                <a:cubicBezTo>
+                  <a:pt x="15192" y="43839"/>
+                  <a:pt x="8944" y="38609"/>
+                  <a:pt x="4372" y="32340"/>
+                </a:cubicBezTo>
+                <a:cubicBezTo>
+                  <a:pt x="2795" y="30184"/>
+                  <a:pt x="1398" y="27888"/>
+                  <a:pt x="0" y="25573"/>
+                </a:cubicBezTo>
+                <a:lnTo>
+                  <a:pt x="0" y="0"/>
+                </a:lnTo>
+                <a:close/>
+              </a:path>
+            </a:pathLst>
+          </a:custGeom>
+          <a:solidFill>
+            <a:schemeClr val="lt2"/>
+          </a:solidFill>
+          <a:ln>
+            <a:noFill/>
+          </a:ln>
+        </p:spPr>
+        <p:txBody>
+          <a:bodyPr spcFirstLastPara="1" wrap="square" lIns="91425" tIns="91425" rIns="91425" bIns="91425" anchor="ctr" anchorCtr="0">
+            <a:noAutofit/>
+          </a:bodyPr>
+          <a:lstStyle/>
+          <a:p>
+            <a:pPr marL="0" lvl="0" indent="0" algn="l" rtl="0">
+              <a:spcBef>
+                <a:spcPts val="0"/>
+              </a:spcBef>
+              <a:spcAft>
+                <a:spcPts val="0"/>
+              </a:spcAft>
+              <a:buNone/>
+            </a:pPr>
+            <a:endParaRPr/>
+          </a:p>
+        </p:txBody>
+      </p:sp>
+      <p:sp>
+        <p:nvSpPr>
+          <p:cNvPr id="107" name="Google Shape;107;p17"/>
+          <p:cNvSpPr txBox="1">
+            <a:spLocks noGrp="1"/>
+          </p:cNvSpPr>
+          <p:nvPr>
+            <p:ph type="title"/>
+          </p:nvPr>
+        </p:nvSpPr>
+        <p:spPr>
+          <a:xfrm>
+            <a:off x="720000" y="2942000"/>
+            <a:ext cx="4180500" cy="694800"/>
+          </a:xfrm>
+          <a:prstGeom prst="rect">
+            <a:avLst/>
+          </a:prstGeom>
+        </p:spPr>
+        <p:txBody>
+          <a:bodyPr spcFirstLastPara="1" wrap="square" lIns="91425" tIns="91425" rIns="91425" bIns="91425" anchor="b" anchorCtr="0">
+            <a:noAutofit/>
+          </a:bodyPr>
+          <a:lstStyle>
+            <a:lvl1pPr lvl="0" rtl="0">
+              <a:spcBef>
+                <a:spcPts val="0"/>
+              </a:spcBef>
+              <a:spcAft>
+                <a:spcPts val="0"/>
+              </a:spcAft>
+              <a:buSzPts val="3500"/>
+              <a:buNone/>
+              <a:defRPr/>
+            </a:lvl1pPr>
+            <a:lvl2pPr lvl="1" rtl="0">
+              <a:spcBef>
+                <a:spcPts val="0"/>
+              </a:spcBef>
+              <a:spcAft>
+                <a:spcPts val="0"/>
+              </a:spcAft>
+              <a:buSzPts val="3500"/>
+              <a:buNone/>
+              <a:defRPr/>
+            </a:lvl2pPr>
+            <a:lvl3pPr lvl="2" rtl="0">
+              <a:spcBef>
+                <a:spcPts val="0"/>
+              </a:spcBef>
+              <a:spcAft>
+                <a:spcPts val="0"/>
+              </a:spcAft>
+              <a:buSzPts val="3500"/>
+              <a:buNone/>
+              <a:defRPr/>
+            </a:lvl3pPr>
+            <a:lvl4pPr lvl="3" rtl="0">
+              <a:spcBef>
+                <a:spcPts val="0"/>
+              </a:spcBef>
+              <a:spcAft>
+                <a:spcPts val="0"/>
+              </a:spcAft>
+              <a:buSzPts val="3500"/>
+              <a:buNone/>
+              <a:defRPr/>
+            </a:lvl4pPr>
+            <a:lvl5pPr lvl="4" rtl="0">
+              <a:spcBef>
+                <a:spcPts val="0"/>
+              </a:spcBef>
+              <a:spcAft>
+                <a:spcPts val="0"/>
+              </a:spcAft>
+              <a:buSzPts val="3500"/>
+              <a:buNone/>
+              <a:defRPr/>
+            </a:lvl5pPr>
+            <a:lvl6pPr lvl="5" rtl="0">
+              <a:spcBef>
+                <a:spcPts val="0"/>
+              </a:spcBef>
+              <a:spcAft>
+                <a:spcPts val="0"/>
+              </a:spcAft>
+              <a:buSzPts val="3500"/>
+              <a:buNone/>
+              <a:defRPr/>
+            </a:lvl6pPr>
+            <a:lvl7pPr lvl="6" rtl="0">
+              <a:spcBef>
+                <a:spcPts val="0"/>
+              </a:spcBef>
+              <a:spcAft>
+                <a:spcPts val="0"/>
+              </a:spcAft>
+              <a:buSzPts val="3500"/>
+              <a:buNone/>
+              <a:defRPr/>
+            </a:lvl7pPr>
+            <a:lvl8pPr lvl="7" rtl="0">
+              <a:spcBef>
+                <a:spcPts val="0"/>
+              </a:spcBef>
+              <a:spcAft>
+                <a:spcPts val="0"/>
+              </a:spcAft>
+              <a:buSzPts val="3500"/>
+              <a:buNone/>
+              <a:defRPr/>
+            </a:lvl8pPr>
+            <a:lvl9pPr lvl="8" rtl="0">
+              <a:spcBef>
+                <a:spcPts val="0"/>
+              </a:spcBef>
+              <a:spcAft>
+                <a:spcPts val="0"/>
+              </a:spcAft>
+              <a:buSzPts val="3500"/>
+              <a:buNone/>
+              <a:defRPr/>
+            </a:lvl9pPr>
+          </a:lstStyle>
+          <a:p>
+            <a:endParaRPr/>
+          </a:p>
+        </p:txBody>
+      </p:sp>
+      <p:sp>
+        <p:nvSpPr>
+          <p:cNvPr id="108" name="Google Shape;108;p17"/>
+          <p:cNvSpPr txBox="1">
+            <a:spLocks noGrp="1"/>
+          </p:cNvSpPr>
+          <p:nvPr>
+            <p:ph type="subTitle" idx="1"/>
+          </p:nvPr>
+        </p:nvSpPr>
+        <p:spPr>
+          <a:xfrm>
+            <a:off x="720000" y="3636800"/>
+            <a:ext cx="4180500" cy="967200"/>
+          </a:xfrm>
+          <a:prstGeom prst="rect">
+            <a:avLst/>
+          </a:prstGeom>
+        </p:spPr>
+        <p:txBody>
+          <a:bodyPr spcFirstLastPara="1" wrap="square" lIns="91425" tIns="91425" rIns="91425" bIns="91425" anchor="t" anchorCtr="0">
+            <a:noAutofit/>
+          </a:bodyPr>
+          <a:lstStyle>
+            <a:lvl1pPr lvl="0" rtl="0">
+              <a:spcBef>
+                <a:spcPts val="0"/>
+              </a:spcBef>
+              <a:spcAft>
+                <a:spcPts val="0"/>
+              </a:spcAft>
+              <a:buSzPts val="1400"/>
+              <a:buNone/>
+              <a:defRPr/>
+            </a:lvl1pPr>
+            <a:lvl2pPr lvl="1" algn="ctr" rtl="0">
+              <a:lnSpc>
+                <a:spcPct val="100000"/>
+              </a:lnSpc>
+              <a:spcBef>
+                <a:spcPts val="0"/>
+              </a:spcBef>
+              <a:spcAft>
+                <a:spcPts val="0"/>
+              </a:spcAft>
+              <a:buSzPts val="1400"/>
+              <a:buNone/>
+              <a:defRPr/>
+            </a:lvl2pPr>
+            <a:lvl3pPr lvl="2" algn="ctr" rtl="0">
+              <a:lnSpc>
+                <a:spcPct val="100000"/>
+              </a:lnSpc>
+              <a:spcBef>
+                <a:spcPts val="0"/>
+              </a:spcBef>
+              <a:spcAft>
+                <a:spcPts val="0"/>
+              </a:spcAft>
+              <a:buSzPts val="1400"/>
+              <a:buNone/>
+              <a:defRPr/>
+            </a:lvl3pPr>
+            <a:lvl4pPr lvl="3" algn="ctr" rtl="0">
+              <a:lnSpc>
+                <a:spcPct val="100000"/>
+              </a:lnSpc>
+              <a:spcBef>
+                <a:spcPts val="0"/>
+              </a:spcBef>
+              <a:spcAft>
+                <a:spcPts val="0"/>
+              </a:spcAft>
+              <a:buSzPts val="1400"/>
+              <a:buNone/>
+              <a:defRPr/>
+            </a:lvl4pPr>
+            <a:lvl5pPr lvl="4" algn="ctr" rtl="0">
+              <a:lnSpc>
+                <a:spcPct val="100000"/>
+              </a:lnSpc>
+              <a:spcBef>
+                <a:spcPts val="0"/>
+              </a:spcBef>
+              <a:spcAft>
+                <a:spcPts val="0"/>
+              </a:spcAft>
+              <a:buSzPts val="1400"/>
+              <a:buNone/>
+              <a:defRPr/>
+            </a:lvl5pPr>
+            <a:lvl6pPr lvl="5" algn="ctr" rtl="0">
+              <a:lnSpc>
+                <a:spcPct val="100000"/>
+              </a:lnSpc>
+              <a:spcBef>
+                <a:spcPts val="0"/>
+              </a:spcBef>
+              <a:spcAft>
+                <a:spcPts val="0"/>
+              </a:spcAft>
+              <a:buSzPts val="1400"/>
+              <a:buNone/>
+              <a:defRPr/>
+            </a:lvl6pPr>
+            <a:lvl7pPr lvl="6" algn="ctr" rtl="0">
+              <a:lnSpc>
+                <a:spcPct val="100000"/>
+              </a:lnSpc>
+              <a:spcBef>
+                <a:spcPts val="0"/>
+              </a:spcBef>
+              <a:spcAft>
+                <a:spcPts val="0"/>
+              </a:spcAft>
+              <a:buSzPts val="1400"/>
+              <a:buNone/>
+              <a:defRPr/>
+            </a:lvl7pPr>
+            <a:lvl8pPr lvl="7" algn="ctr" rtl="0">
+              <a:lnSpc>
+                <a:spcPct val="100000"/>
+              </a:lnSpc>
+              <a:spcBef>
+                <a:spcPts val="0"/>
+              </a:spcBef>
+              <a:spcAft>
+                <a:spcPts val="0"/>
+              </a:spcAft>
+              <a:buSzPts val="1400"/>
+              <a:buNone/>
+              <a:defRPr/>
+            </a:lvl8pPr>
+            <a:lvl9pPr lvl="8" algn="ctr" rtl="0">
+              <a:lnSpc>
+                <a:spcPct val="100000"/>
+              </a:lnSpc>
+              <a:spcBef>
+                <a:spcPts val="0"/>
+              </a:spcBef>
+              <a:spcAft>
+                <a:spcPts val="0"/>
+              </a:spcAft>
+              <a:buSzPts val="1400"/>
+              <a:buNone/>
+              <a:defRPr/>
+            </a:lvl9pPr>
+          </a:lstStyle>
+          <a:p>
+            <a:endParaRPr/>
+          </a:p>
+        </p:txBody>
+      </p:sp>
+      <p:grpSp>
+        <p:nvGrpSpPr>
+          <p:cNvPr id="109" name="Google Shape;109;p17"/>
+          <p:cNvGrpSpPr/>
+          <p:nvPr/>
+        </p:nvGrpSpPr>
+        <p:grpSpPr>
+          <a:xfrm rot="478948">
+            <a:off x="7779090" y="4614186"/>
+            <a:ext cx="160368" cy="193469"/>
+            <a:chOff x="1096838" y="391396"/>
+            <a:chExt cx="245538" cy="296218"/>
+          </a:xfrm>
+        </p:grpSpPr>
+        <p:sp>
+          <p:nvSpPr>
+            <p:cNvPr id="110" name="Google Shape;110;p17"/>
+            <p:cNvSpPr/>
+            <p:nvPr/>
+          </p:nvSpPr>
+          <p:spPr>
+            <a:xfrm>
+              <a:off x="1096838" y="391396"/>
+              <a:ext cx="245538" cy="296218"/>
+            </a:xfrm>
+            <a:custGeom>
+              <a:avLst/>
+              <a:gdLst/>
+              <a:ahLst/>
+              <a:cxnLst/>
+              <a:rect l="l" t="t" r="r" b="b"/>
+              <a:pathLst>
+                <a:path w="5620" h="6780" extrusionOk="0">
+                  <a:moveTo>
+                    <a:pt x="2259" y="1"/>
+                  </a:moveTo>
+                  <a:cubicBezTo>
+                    <a:pt x="2201" y="1"/>
+                    <a:pt x="2143" y="42"/>
+                    <a:pt x="2153" y="116"/>
+                  </a:cubicBezTo>
+                  <a:cubicBezTo>
+                    <a:pt x="2272" y="930"/>
+                    <a:pt x="2257" y="1818"/>
+                    <a:pt x="1847" y="2554"/>
+                  </a:cubicBezTo>
+                  <a:cubicBezTo>
+                    <a:pt x="1495" y="3189"/>
+                    <a:pt x="848" y="3674"/>
+                    <a:pt x="107" y="3687"/>
+                  </a:cubicBezTo>
+                  <a:cubicBezTo>
+                    <a:pt x="20" y="3689"/>
+                    <a:pt x="1" y="3774"/>
+                    <a:pt x="34" y="3836"/>
+                  </a:cubicBezTo>
+                  <a:cubicBezTo>
+                    <a:pt x="19" y="3899"/>
+                    <a:pt x="62" y="3982"/>
+                    <a:pt x="146" y="3982"/>
+                  </a:cubicBezTo>
+                  <a:cubicBezTo>
+                    <a:pt x="147" y="3982"/>
+                    <a:pt x="148" y="3982"/>
+                    <a:pt x="148" y="3982"/>
+                  </a:cubicBezTo>
+                  <a:cubicBezTo>
+                    <a:pt x="249" y="3979"/>
+                    <a:pt x="351" y="3977"/>
+                    <a:pt x="453" y="3977"/>
+                  </a:cubicBezTo>
+                  <a:cubicBezTo>
+                    <a:pt x="720" y="3977"/>
+                    <a:pt x="989" y="3993"/>
+                    <a:pt x="1248" y="4058"/>
+                  </a:cubicBezTo>
+                  <a:cubicBezTo>
+                    <a:pt x="1603" y="4149"/>
+                    <a:pt x="1901" y="4350"/>
+                    <a:pt x="2126" y="4637"/>
+                  </a:cubicBezTo>
+                  <a:cubicBezTo>
+                    <a:pt x="2599" y="5240"/>
+                    <a:pt x="2713" y="6028"/>
+                    <a:pt x="3026" y="6713"/>
+                  </a:cubicBezTo>
+                  <a:cubicBezTo>
+                    <a:pt x="3034" y="6733"/>
+                    <a:pt x="3046" y="6745"/>
+                    <a:pt x="3061" y="6755"/>
+                  </a:cubicBezTo>
+                  <a:cubicBezTo>
+                    <a:pt x="3079" y="6772"/>
+                    <a:pt x="3103" y="6780"/>
+                    <a:pt x="3128" y="6780"/>
+                  </a:cubicBezTo>
+                  <a:cubicBezTo>
+                    <a:pt x="3186" y="6780"/>
+                    <a:pt x="3248" y="6738"/>
+                    <a:pt x="3243" y="6663"/>
+                  </a:cubicBezTo>
+                  <a:cubicBezTo>
+                    <a:pt x="3196" y="5884"/>
+                    <a:pt x="3194" y="5037"/>
+                    <a:pt x="3637" y="4360"/>
+                  </a:cubicBezTo>
+                  <a:cubicBezTo>
+                    <a:pt x="4063" y="3706"/>
+                    <a:pt x="4799" y="3517"/>
+                    <a:pt x="5519" y="3367"/>
+                  </a:cubicBezTo>
+                  <a:cubicBezTo>
+                    <a:pt x="5600" y="3349"/>
+                    <a:pt x="5619" y="3265"/>
+                    <a:pt x="5594" y="3208"/>
+                  </a:cubicBezTo>
+                  <a:cubicBezTo>
+                    <a:pt x="5608" y="3151"/>
+                    <a:pt x="5584" y="3086"/>
+                    <a:pt x="5508" y="3084"/>
+                  </a:cubicBezTo>
+                  <a:cubicBezTo>
+                    <a:pt x="4752" y="3067"/>
+                    <a:pt x="3924" y="2962"/>
+                    <a:pt x="3351" y="2418"/>
+                  </a:cubicBezTo>
+                  <a:cubicBezTo>
+                    <a:pt x="2720" y="1820"/>
+                    <a:pt x="2545" y="921"/>
+                    <a:pt x="2387" y="104"/>
+                  </a:cubicBezTo>
+                  <a:cubicBezTo>
+                    <a:pt x="2380" y="69"/>
+                    <a:pt x="2361" y="45"/>
+                    <a:pt x="2336" y="32"/>
+                  </a:cubicBezTo>
+                  <a:cubicBezTo>
+                    <a:pt x="2316" y="11"/>
+                    <a:pt x="2287" y="1"/>
+                    <a:pt x="2259" y="1"/>
+                  </a:cubicBezTo>
+                  <a:close/>
+                </a:path>
+              </a:pathLst>
+            </a:custGeom>
+            <a:solidFill>
+              <a:schemeClr val="accent4"/>
+            </a:solidFill>
+            <a:ln w="76200" cap="flat" cmpd="sng">
+              <a:solidFill>
+                <a:schemeClr val="accent6"/>
+              </a:solidFill>
+              <a:prstDash val="solid"/>
+              <a:round/>
+              <a:headEnd type="none" w="sm" len="sm"/>
+              <a:tailEnd type="none" w="sm" len="sm"/>
+            </a:ln>
+            <a:effectLst>
+              <a:outerShdw dist="28575" dir="2400000" algn="bl" rotWithShape="0">
+                <a:schemeClr val="dk1">
+                  <a:alpha val="60000"/>
+                </a:schemeClr>
+              </a:outerShdw>
+            </a:effectLst>
+          </p:spPr>
+          <p:txBody>
+            <a:bodyPr spcFirstLastPara="1" wrap="square" lIns="91425" tIns="91425" rIns="91425" bIns="91425" anchor="ctr" anchorCtr="0">
+              <a:noAutofit/>
+            </a:bodyPr>
+            <a:lstStyle/>
+            <a:p>
+              <a:pPr marL="0" lvl="0" indent="0" algn="l" rtl="0">
+                <a:spcBef>
+                  <a:spcPts val="0"/>
+                </a:spcBef>
+                <a:spcAft>
+                  <a:spcPts val="0"/>
+                </a:spcAft>
+                <a:buNone/>
+              </a:pPr>
+              <a:endParaRPr/>
+            </a:p>
+          </p:txBody>
+        </p:sp>
+        <p:sp>
+          <p:nvSpPr>
+            <p:cNvPr id="111" name="Google Shape;111;p17"/>
+            <p:cNvSpPr/>
+            <p:nvPr/>
+          </p:nvSpPr>
+          <p:spPr>
+            <a:xfrm>
+              <a:off x="1096838" y="391396"/>
+              <a:ext cx="245538" cy="296218"/>
+            </a:xfrm>
+            <a:custGeom>
+              <a:avLst/>
+              <a:gdLst/>
+              <a:ahLst/>
+              <a:cxnLst/>
+              <a:rect l="l" t="t" r="r" b="b"/>
+              <a:pathLst>
+                <a:path w="5620" h="6780" extrusionOk="0">
+                  <a:moveTo>
+                    <a:pt x="2259" y="1"/>
+                  </a:moveTo>
+                  <a:cubicBezTo>
+                    <a:pt x="2201" y="1"/>
+                    <a:pt x="2143" y="42"/>
+                    <a:pt x="2153" y="116"/>
+                  </a:cubicBezTo>
+                  <a:cubicBezTo>
+                    <a:pt x="2272" y="930"/>
+                    <a:pt x="2257" y="1818"/>
+                    <a:pt x="1847" y="2554"/>
+                  </a:cubicBezTo>
+                  <a:cubicBezTo>
+                    <a:pt x="1495" y="3189"/>
+                    <a:pt x="848" y="3674"/>
+                    <a:pt x="107" y="3687"/>
+                  </a:cubicBezTo>
+                  <a:cubicBezTo>
+                    <a:pt x="20" y="3689"/>
+                    <a:pt x="1" y="3774"/>
+                    <a:pt x="34" y="3836"/>
+                  </a:cubicBezTo>
+                  <a:cubicBezTo>
+                    <a:pt x="19" y="3899"/>
+                    <a:pt x="62" y="3982"/>
+                    <a:pt x="146" y="3982"/>
+                  </a:cubicBezTo>
+                  <a:cubicBezTo>
+                    <a:pt x="147" y="3982"/>
+                    <a:pt x="148" y="3982"/>
+                    <a:pt x="148" y="3982"/>
+                  </a:cubicBezTo>
+                  <a:cubicBezTo>
+                    <a:pt x="249" y="3979"/>
+                    <a:pt x="351" y="3977"/>
+                    <a:pt x="453" y="3977"/>
+                  </a:cubicBezTo>
+                  <a:cubicBezTo>
+                    <a:pt x="720" y="3977"/>
+                    <a:pt x="989" y="3993"/>
+                    <a:pt x="1248" y="4058"/>
+                  </a:cubicBezTo>
+                  <a:cubicBezTo>
+                    <a:pt x="1603" y="4149"/>
+                    <a:pt x="1901" y="4350"/>
+                    <a:pt x="2126" y="4637"/>
+                  </a:cubicBezTo>
+                  <a:cubicBezTo>
+                    <a:pt x="2599" y="5240"/>
+                    <a:pt x="2713" y="6028"/>
+                    <a:pt x="3026" y="6713"/>
+                  </a:cubicBezTo>
+                  <a:cubicBezTo>
+                    <a:pt x="3034" y="6733"/>
+                    <a:pt x="3046" y="6745"/>
+                    <a:pt x="3061" y="6755"/>
+                  </a:cubicBezTo>
+                  <a:cubicBezTo>
+                    <a:pt x="3079" y="6772"/>
+                    <a:pt x="3103" y="6780"/>
+                    <a:pt x="3128" y="6780"/>
+                  </a:cubicBezTo>
+                  <a:cubicBezTo>
+                    <a:pt x="3186" y="6780"/>
+                    <a:pt x="3248" y="6738"/>
+                    <a:pt x="3243" y="6663"/>
+                  </a:cubicBezTo>
+                  <a:cubicBezTo>
+                    <a:pt x="3196" y="5884"/>
+                    <a:pt x="3194" y="5037"/>
+                    <a:pt x="3637" y="4360"/>
+                  </a:cubicBezTo>
+                  <a:cubicBezTo>
+                    <a:pt x="4063" y="3706"/>
+                    <a:pt x="4799" y="3517"/>
+                    <a:pt x="5519" y="3367"/>
+                  </a:cubicBezTo>
+                  <a:cubicBezTo>
+                    <a:pt x="5600" y="3349"/>
+                    <a:pt x="5619" y="3265"/>
+                    <a:pt x="5594" y="3208"/>
+                  </a:cubicBezTo>
+                  <a:cubicBezTo>
+                    <a:pt x="5608" y="3151"/>
+                    <a:pt x="5584" y="3086"/>
+                    <a:pt x="5508" y="3084"/>
+                  </a:cubicBezTo>
+                  <a:cubicBezTo>
+                    <a:pt x="4752" y="3067"/>
+                    <a:pt x="3924" y="2962"/>
+                    <a:pt x="3351" y="2418"/>
+                  </a:cubicBezTo>
+                  <a:cubicBezTo>
+                    <a:pt x="2720" y="1820"/>
+                    <a:pt x="2545" y="921"/>
+                    <a:pt x="2387" y="104"/>
+                  </a:cubicBezTo>
+                  <a:cubicBezTo>
+                    <a:pt x="2380" y="69"/>
+                    <a:pt x="2361" y="45"/>
+                    <a:pt x="2336" y="32"/>
+                  </a:cubicBezTo>
+                  <a:cubicBezTo>
+                    <a:pt x="2316" y="11"/>
+                    <a:pt x="2287" y="1"/>
+                    <a:pt x="2259" y="1"/>
+                  </a:cubicBezTo>
+                  <a:close/>
+                </a:path>
+              </a:pathLst>
+            </a:custGeom>
+            <a:solidFill>
+              <a:schemeClr val="accent2"/>
+            </a:solidFill>
+            <a:ln>
+              <a:noFill/>
+            </a:ln>
+          </p:spPr>
+          <p:txBody>
+            <a:bodyPr spcFirstLastPara="1" wrap="square" lIns="91425" tIns="91425" rIns="91425" bIns="91425" anchor="ctr" anchorCtr="0">
+              <a:noAutofit/>
+            </a:bodyPr>
+            <a:lstStyle/>
+            <a:p>
+              <a:pPr marL="0" lvl="0" indent="0" algn="l" rtl="0">
+                <a:spcBef>
+                  <a:spcPts val="0"/>
+                </a:spcBef>
+                <a:spcAft>
+                  <a:spcPts val="0"/>
+                </a:spcAft>
+                <a:buNone/>
+              </a:pPr>
+              <a:endParaRPr/>
+            </a:p>
+          </p:txBody>
+        </p:sp>
+      </p:grpSp>
+    </p:spTree>
+  </p:cSld>
+  <p:clrMapOvr>
+    <a:masterClrMapping/>
+  </p:clrMapOvr>
+</p:sldLayout>
+</file>
+
 <file path=ppt/slideMasters/slideMaster1.xml><?xml version="1.0" encoding="utf-8"?>
 <p:sldMaster xmlns:a="http://schemas.openxmlformats.org/drawingml/2006/main" xmlns:r="http://schemas.openxmlformats.org/officeDocument/2006/relationships" xmlns:p="http://schemas.openxmlformats.org/presentationml/2006/main">
   <p:cSld name="simple-light-2">
@@ -14022,16 +13997,15 @@
     <p:sldLayoutId id="2147483653" r:id="rId4"/>
     <p:sldLayoutId id="2147483656" r:id="rId5"/>
     <p:sldLayoutId id="2147483657" r:id="rId6"/>
-    <p:sldLayoutId id="2147483658" r:id="rId7"/>
-    <p:sldLayoutId id="2147483661" r:id="rId8"/>
-    <p:sldLayoutId id="2147483662" r:id="rId9"/>
-    <p:sldLayoutId id="2147483663" r:id="rId10"/>
-    <p:sldLayoutId id="2147483664" r:id="rId11"/>
-    <p:sldLayoutId id="2147483667" r:id="rId12"/>
-    <p:sldLayoutId id="2147483668" r:id="rId13"/>
-    <p:sldLayoutId id="2147483673" r:id="rId14"/>
-    <p:sldLayoutId id="2147483674" r:id="rId15"/>
-    <p:sldLayoutId id="2147483675" r:id="rId16"/>
+    <p:sldLayoutId id="2147483661" r:id="rId7"/>
+    <p:sldLayoutId id="2147483662" r:id="rId8"/>
+    <p:sldLayoutId id="2147483663" r:id="rId9"/>
+    <p:sldLayoutId id="2147483664" r:id="rId10"/>
+    <p:sldLayoutId id="2147483667" r:id="rId11"/>
+    <p:sldLayoutId id="2147483668" r:id="rId12"/>
+    <p:sldLayoutId id="2147483673" r:id="rId13"/>
+    <p:sldLayoutId id="2147483674" r:id="rId14"/>
+    <p:sldLayoutId id="2147483675" r:id="rId15"/>
   </p:sldLayoutIdLst>
   <p:hf hdr="0" ftr="0" dt="0"/>
   <p:txStyles>
@@ -16727,8 +16701,8 @@
         </p:nvSpPr>
         <p:spPr>
           <a:xfrm>
-            <a:off x="2545503" y="86400"/>
-            <a:ext cx="3891298" cy="871200"/>
+            <a:off x="-150637" y="54350"/>
+            <a:ext cx="3555846" cy="871200"/>
           </a:xfrm>
         </p:spPr>
         <p:txBody>
@@ -16750,6 +16724,2611 @@
                 <a:sym typeface="Arial"/>
               </a:rPr>
               <a:t>Diagrama de Solução</a:t>
+            </a:r>
+          </a:p>
+        </p:txBody>
+      </p:sp>
+      <p:grpSp>
+        <p:nvGrpSpPr>
+          <p:cNvPr id="170" name="Group 2">
+            <a:extLst>
+              <a:ext uri="{FF2B5EF4-FFF2-40B4-BE49-F238E27FC236}">
+                <a16:creationId xmlns:a16="http://schemas.microsoft.com/office/drawing/2014/main" id="{DD3DA973-6F5B-031C-FB32-C9F9B73A2599}"/>
+              </a:ext>
+            </a:extLst>
+          </p:cNvPr>
+          <p:cNvGrpSpPr/>
+          <p:nvPr/>
+        </p:nvGrpSpPr>
+        <p:grpSpPr>
+          <a:xfrm>
+            <a:off x="440379" y="3811112"/>
+            <a:ext cx="488875" cy="453791"/>
+            <a:chOff x="0" y="0"/>
+            <a:chExt cx="812800" cy="754468"/>
+          </a:xfrm>
+        </p:grpSpPr>
+        <p:sp>
+          <p:nvSpPr>
+            <p:cNvPr id="171" name="Freeform 3">
+              <a:extLst>
+                <a:ext uri="{FF2B5EF4-FFF2-40B4-BE49-F238E27FC236}">
+                  <a16:creationId xmlns:a16="http://schemas.microsoft.com/office/drawing/2014/main" id="{708E3FCA-1A38-E200-32D2-EDD628446893}"/>
+                </a:ext>
+              </a:extLst>
+            </p:cNvPr>
+            <p:cNvSpPr/>
+            <p:nvPr/>
+          </p:nvSpPr>
+          <p:spPr>
+            <a:xfrm>
+              <a:off x="0" y="0"/>
+              <a:ext cx="812800" cy="754468"/>
+            </a:xfrm>
+            <a:custGeom>
+              <a:avLst/>
+              <a:gdLst/>
+              <a:ahLst/>
+              <a:cxnLst/>
+              <a:rect l="l" t="t" r="r" b="b"/>
+              <a:pathLst>
+                <a:path w="812800" h="754468">
+                  <a:moveTo>
+                    <a:pt x="406400" y="0"/>
+                  </a:moveTo>
+                  <a:cubicBezTo>
+                    <a:pt x="181951" y="0"/>
+                    <a:pt x="0" y="168894"/>
+                    <a:pt x="0" y="377234"/>
+                  </a:cubicBezTo>
+                  <a:cubicBezTo>
+                    <a:pt x="0" y="585575"/>
+                    <a:pt x="181951" y="754468"/>
+                    <a:pt x="406400" y="754468"/>
+                  </a:cubicBezTo>
+                  <a:cubicBezTo>
+                    <a:pt x="630849" y="754468"/>
+                    <a:pt x="812800" y="585575"/>
+                    <a:pt x="812800" y="377234"/>
+                  </a:cubicBezTo>
+                  <a:cubicBezTo>
+                    <a:pt x="812800" y="168894"/>
+                    <a:pt x="630849" y="0"/>
+                    <a:pt x="406400" y="0"/>
+                  </a:cubicBezTo>
+                  <a:close/>
+                </a:path>
+              </a:pathLst>
+            </a:custGeom>
+            <a:solidFill>
+              <a:srgbClr val="FCDC66"/>
+            </a:solidFill>
+          </p:spPr>
+          <p:txBody>
+            <a:bodyPr/>
+            <a:lstStyle/>
+            <a:p>
+              <a:endParaRPr lang="pt-BR" sz="700"/>
+            </a:p>
+          </p:txBody>
+        </p:sp>
+        <p:sp>
+          <p:nvSpPr>
+            <p:cNvPr id="172" name="TextBox 4">
+              <a:extLst>
+                <a:ext uri="{FF2B5EF4-FFF2-40B4-BE49-F238E27FC236}">
+                  <a16:creationId xmlns:a16="http://schemas.microsoft.com/office/drawing/2014/main" id="{7A45AF28-A9CE-3CA0-AA02-7CFC0A006C7A}"/>
+                </a:ext>
+              </a:extLst>
+            </p:cNvPr>
+            <p:cNvSpPr txBox="1"/>
+            <p:nvPr/>
+          </p:nvSpPr>
+          <p:spPr>
+            <a:xfrm>
+              <a:off x="76200" y="42156"/>
+              <a:ext cx="660400" cy="641581"/>
+            </a:xfrm>
+            <a:prstGeom prst="rect">
+              <a:avLst/>
+            </a:prstGeom>
+          </p:spPr>
+          <p:txBody>
+            <a:bodyPr lIns="19574" tIns="19574" rIns="19574" bIns="19574" rtlCol="0" anchor="ctr"/>
+            <a:lstStyle/>
+            <a:p>
+              <a:pPr marL="183016" lvl="1" indent="-91508" algn="ctr">
+                <a:lnSpc>
+                  <a:spcPts val="1187"/>
+                </a:lnSpc>
+                <a:buAutoNum type="arabicPeriod"/>
+              </a:pPr>
+              <a:endParaRPr sz="700"/>
+            </a:p>
+          </p:txBody>
+        </p:sp>
+      </p:grpSp>
+      <p:sp>
+        <p:nvSpPr>
+          <p:cNvPr id="173" name="Freeform 5">
+            <a:extLst>
+              <a:ext uri="{FF2B5EF4-FFF2-40B4-BE49-F238E27FC236}">
+                <a16:creationId xmlns:a16="http://schemas.microsoft.com/office/drawing/2014/main" id="{FDADEAF2-29F7-7FC5-CDC3-9A8982067B7C}"/>
+              </a:ext>
+            </a:extLst>
+          </p:cNvPr>
+          <p:cNvSpPr/>
+          <p:nvPr/>
+        </p:nvSpPr>
+        <p:spPr>
+          <a:xfrm rot="5400000">
+            <a:off x="562344" y="3906637"/>
+            <a:ext cx="248759" cy="329641"/>
+          </a:xfrm>
+          <a:custGeom>
+            <a:avLst/>
+            <a:gdLst/>
+            <a:ahLst/>
+            <a:cxnLst/>
+            <a:rect l="l" t="t" r="r" b="b"/>
+            <a:pathLst>
+              <a:path w="497518" h="659281">
+                <a:moveTo>
+                  <a:pt x="0" y="0"/>
+                </a:moveTo>
+                <a:lnTo>
+                  <a:pt x="497518" y="0"/>
+                </a:lnTo>
+                <a:lnTo>
+                  <a:pt x="497518" y="659281"/>
+                </a:lnTo>
+                <a:lnTo>
+                  <a:pt x="0" y="659281"/>
+                </a:lnTo>
+                <a:lnTo>
+                  <a:pt x="0" y="0"/>
+                </a:lnTo>
+                <a:close/>
+              </a:path>
+            </a:pathLst>
+          </a:custGeom>
+          <a:blipFill>
+            <a:blip r:embed="rId2"/>
+            <a:stretch>
+              <a:fillRect l="-38300" t="-19762" r="-43026" b="-17073"/>
+            </a:stretch>
+          </a:blipFill>
+        </p:spPr>
+        <p:txBody>
+          <a:bodyPr/>
+          <a:lstStyle/>
+          <a:p>
+            <a:endParaRPr lang="pt-BR" sz="700"/>
+          </a:p>
+        </p:txBody>
+      </p:sp>
+      <p:grpSp>
+        <p:nvGrpSpPr>
+          <p:cNvPr id="174" name="Group 6">
+            <a:extLst>
+              <a:ext uri="{FF2B5EF4-FFF2-40B4-BE49-F238E27FC236}">
+                <a16:creationId xmlns:a16="http://schemas.microsoft.com/office/drawing/2014/main" id="{5C40B1F0-E251-9514-F722-B5C7D2E43138}"/>
+              </a:ext>
+            </a:extLst>
+          </p:cNvPr>
+          <p:cNvGrpSpPr/>
+          <p:nvPr/>
+        </p:nvGrpSpPr>
+        <p:grpSpPr>
+          <a:xfrm>
+            <a:off x="589386" y="3863483"/>
+            <a:ext cx="196657" cy="114750"/>
+            <a:chOff x="0" y="0"/>
+            <a:chExt cx="233452" cy="136220"/>
+          </a:xfrm>
+        </p:grpSpPr>
+        <p:sp>
+          <p:nvSpPr>
+            <p:cNvPr id="175" name="Freeform 7">
+              <a:extLst>
+                <a:ext uri="{FF2B5EF4-FFF2-40B4-BE49-F238E27FC236}">
+                  <a16:creationId xmlns:a16="http://schemas.microsoft.com/office/drawing/2014/main" id="{F7937DD1-0B1A-0C92-D894-B85200986A8D}"/>
+                </a:ext>
+              </a:extLst>
+            </p:cNvPr>
+            <p:cNvSpPr/>
+            <p:nvPr/>
+          </p:nvSpPr>
+          <p:spPr>
+            <a:xfrm>
+              <a:off x="0" y="0"/>
+              <a:ext cx="233452" cy="136220"/>
+            </a:xfrm>
+            <a:custGeom>
+              <a:avLst/>
+              <a:gdLst/>
+              <a:ahLst/>
+              <a:cxnLst/>
+              <a:rect l="l" t="t" r="r" b="b"/>
+              <a:pathLst>
+                <a:path w="233452" h="136220">
+                  <a:moveTo>
+                    <a:pt x="0" y="0"/>
+                  </a:moveTo>
+                  <a:lnTo>
+                    <a:pt x="233452" y="0"/>
+                  </a:lnTo>
+                  <a:lnTo>
+                    <a:pt x="233452" y="136220"/>
+                  </a:lnTo>
+                  <a:lnTo>
+                    <a:pt x="0" y="136220"/>
+                  </a:lnTo>
+                  <a:close/>
+                </a:path>
+              </a:pathLst>
+            </a:custGeom>
+            <a:solidFill>
+              <a:srgbClr val="000000"/>
+            </a:solidFill>
+          </p:spPr>
+          <p:txBody>
+            <a:bodyPr/>
+            <a:lstStyle/>
+            <a:p>
+              <a:endParaRPr lang="pt-BR" sz="700"/>
+            </a:p>
+          </p:txBody>
+        </p:sp>
+        <p:sp>
+          <p:nvSpPr>
+            <p:cNvPr id="176" name="TextBox 8">
+              <a:extLst>
+                <a:ext uri="{FF2B5EF4-FFF2-40B4-BE49-F238E27FC236}">
+                  <a16:creationId xmlns:a16="http://schemas.microsoft.com/office/drawing/2014/main" id="{9125D1E7-FBC0-B196-8F5B-859B07A7CAEF}"/>
+                </a:ext>
+              </a:extLst>
+            </p:cNvPr>
+            <p:cNvSpPr txBox="1"/>
+            <p:nvPr/>
+          </p:nvSpPr>
+          <p:spPr>
+            <a:xfrm>
+              <a:off x="0" y="-28575"/>
+              <a:ext cx="233452" cy="164795"/>
+            </a:xfrm>
+            <a:prstGeom prst="rect">
+              <a:avLst/>
+            </a:prstGeom>
+          </p:spPr>
+          <p:txBody>
+            <a:bodyPr lIns="19574" tIns="19574" rIns="19574" bIns="19574" rtlCol="0" anchor="ctr"/>
+            <a:lstStyle/>
+            <a:p>
+              <a:pPr algn="ctr">
+                <a:lnSpc>
+                  <a:spcPts val="1025"/>
+                </a:lnSpc>
+              </a:pPr>
+              <a:endParaRPr sz="700"/>
+            </a:p>
+          </p:txBody>
+        </p:sp>
+      </p:grpSp>
+      <p:grpSp>
+        <p:nvGrpSpPr>
+          <p:cNvPr id="177" name="Group 9">
+            <a:extLst>
+              <a:ext uri="{FF2B5EF4-FFF2-40B4-BE49-F238E27FC236}">
+                <a16:creationId xmlns:a16="http://schemas.microsoft.com/office/drawing/2014/main" id="{BF2F444F-438C-4B88-27F9-F5373E5C7F6D}"/>
+              </a:ext>
+            </a:extLst>
+          </p:cNvPr>
+          <p:cNvGrpSpPr/>
+          <p:nvPr/>
+        </p:nvGrpSpPr>
+        <p:grpSpPr>
+          <a:xfrm>
+            <a:off x="614138" y="3885399"/>
+            <a:ext cx="141048" cy="142829"/>
+            <a:chOff x="0" y="0"/>
+            <a:chExt cx="812800" cy="823065"/>
+          </a:xfrm>
+        </p:grpSpPr>
+        <p:sp>
+          <p:nvSpPr>
+            <p:cNvPr id="178" name="Freeform 10">
+              <a:extLst>
+                <a:ext uri="{FF2B5EF4-FFF2-40B4-BE49-F238E27FC236}">
+                  <a16:creationId xmlns:a16="http://schemas.microsoft.com/office/drawing/2014/main" id="{6D255C66-A30A-5D29-28D4-042E562EDB9D}"/>
+                </a:ext>
+              </a:extLst>
+            </p:cNvPr>
+            <p:cNvSpPr/>
+            <p:nvPr/>
+          </p:nvSpPr>
+          <p:spPr>
+            <a:xfrm>
+              <a:off x="0" y="0"/>
+              <a:ext cx="812800" cy="823065"/>
+            </a:xfrm>
+            <a:custGeom>
+              <a:avLst/>
+              <a:gdLst/>
+              <a:ahLst/>
+              <a:cxnLst/>
+              <a:rect l="l" t="t" r="r" b="b"/>
+              <a:pathLst>
+                <a:path w="812800" h="823065">
+                  <a:moveTo>
+                    <a:pt x="406400" y="0"/>
+                  </a:moveTo>
+                  <a:cubicBezTo>
+                    <a:pt x="181951" y="0"/>
+                    <a:pt x="0" y="184249"/>
+                    <a:pt x="0" y="411532"/>
+                  </a:cubicBezTo>
+                  <a:cubicBezTo>
+                    <a:pt x="0" y="638815"/>
+                    <a:pt x="181951" y="823065"/>
+                    <a:pt x="406400" y="823065"/>
+                  </a:cubicBezTo>
+                  <a:cubicBezTo>
+                    <a:pt x="630849" y="823065"/>
+                    <a:pt x="812800" y="638815"/>
+                    <a:pt x="812800" y="411532"/>
+                  </a:cubicBezTo>
+                  <a:cubicBezTo>
+                    <a:pt x="812800" y="184249"/>
+                    <a:pt x="630849" y="0"/>
+                    <a:pt x="406400" y="0"/>
+                  </a:cubicBezTo>
+                  <a:close/>
+                </a:path>
+              </a:pathLst>
+            </a:custGeom>
+            <a:solidFill>
+              <a:srgbClr val="FCDC66"/>
+            </a:solidFill>
+          </p:spPr>
+          <p:txBody>
+            <a:bodyPr/>
+            <a:lstStyle/>
+            <a:p>
+              <a:endParaRPr lang="pt-BR" sz="700"/>
+            </a:p>
+          </p:txBody>
+        </p:sp>
+        <p:sp>
+          <p:nvSpPr>
+            <p:cNvPr id="179" name="TextBox 11">
+              <a:extLst>
+                <a:ext uri="{FF2B5EF4-FFF2-40B4-BE49-F238E27FC236}">
+                  <a16:creationId xmlns:a16="http://schemas.microsoft.com/office/drawing/2014/main" id="{3D944EA1-B90E-935D-68B7-278862ACA203}"/>
+                </a:ext>
+              </a:extLst>
+            </p:cNvPr>
+            <p:cNvSpPr txBox="1"/>
+            <p:nvPr/>
+          </p:nvSpPr>
+          <p:spPr>
+            <a:xfrm>
+              <a:off x="76200" y="48587"/>
+              <a:ext cx="660400" cy="697315"/>
+            </a:xfrm>
+            <a:prstGeom prst="rect">
+              <a:avLst/>
+            </a:prstGeom>
+          </p:spPr>
+          <p:txBody>
+            <a:bodyPr lIns="19574" tIns="19574" rIns="19574" bIns="19574" rtlCol="0" anchor="ctr"/>
+            <a:lstStyle/>
+            <a:p>
+              <a:pPr algn="ctr">
+                <a:lnSpc>
+                  <a:spcPts val="1025"/>
+                </a:lnSpc>
+              </a:pPr>
+              <a:endParaRPr sz="700"/>
+            </a:p>
+          </p:txBody>
+        </p:sp>
+      </p:grpSp>
+      <p:sp>
+        <p:nvSpPr>
+          <p:cNvPr id="180" name="Freeform 12">
+            <a:extLst>
+              <a:ext uri="{FF2B5EF4-FFF2-40B4-BE49-F238E27FC236}">
+                <a16:creationId xmlns:a16="http://schemas.microsoft.com/office/drawing/2014/main" id="{6185539D-89E3-F4AE-01BB-95571FD85022}"/>
+              </a:ext>
+            </a:extLst>
+          </p:cNvPr>
+          <p:cNvSpPr/>
+          <p:nvPr/>
+        </p:nvSpPr>
+        <p:spPr>
+          <a:xfrm>
+            <a:off x="622096" y="3894070"/>
+            <a:ext cx="125132" cy="125486"/>
+          </a:xfrm>
+          <a:custGeom>
+            <a:avLst/>
+            <a:gdLst/>
+            <a:ahLst/>
+            <a:cxnLst/>
+            <a:rect l="l" t="t" r="r" b="b"/>
+            <a:pathLst>
+              <a:path w="250263" h="250972">
+                <a:moveTo>
+                  <a:pt x="0" y="0"/>
+                </a:moveTo>
+                <a:lnTo>
+                  <a:pt x="250262" y="0"/>
+                </a:lnTo>
+                <a:lnTo>
+                  <a:pt x="250262" y="250973"/>
+                </a:lnTo>
+                <a:lnTo>
+                  <a:pt x="0" y="250973"/>
+                </a:lnTo>
+                <a:lnTo>
+                  <a:pt x="0" y="0"/>
+                </a:lnTo>
+                <a:close/>
+              </a:path>
+            </a:pathLst>
+          </a:custGeom>
+          <a:blipFill>
+            <a:blip r:embed="rId3"/>
+            <a:stretch>
+              <a:fillRect l="-5681" t="-4150" r="-20501" b="-21675"/>
+            </a:stretch>
+          </a:blipFill>
+        </p:spPr>
+        <p:txBody>
+          <a:bodyPr/>
+          <a:lstStyle/>
+          <a:p>
+            <a:endParaRPr lang="pt-BR" sz="700"/>
+          </a:p>
+        </p:txBody>
+      </p:sp>
+      <p:sp>
+        <p:nvSpPr>
+          <p:cNvPr id="181" name="Freeform 13">
+            <a:extLst>
+              <a:ext uri="{FF2B5EF4-FFF2-40B4-BE49-F238E27FC236}">
+                <a16:creationId xmlns:a16="http://schemas.microsoft.com/office/drawing/2014/main" id="{F98EB1B9-7F80-886A-DB37-C0DF783F13C7}"/>
+              </a:ext>
+            </a:extLst>
+          </p:cNvPr>
+          <p:cNvSpPr/>
+          <p:nvPr/>
+        </p:nvSpPr>
+        <p:spPr>
+          <a:xfrm rot="-1368118">
+            <a:off x="870636" y="3802092"/>
+            <a:ext cx="576545" cy="110046"/>
+          </a:xfrm>
+          <a:custGeom>
+            <a:avLst/>
+            <a:gdLst/>
+            <a:ahLst/>
+            <a:cxnLst/>
+            <a:rect l="l" t="t" r="r" b="b"/>
+            <a:pathLst>
+              <a:path w="1153090" h="220091">
+                <a:moveTo>
+                  <a:pt x="0" y="0"/>
+                </a:moveTo>
+                <a:lnTo>
+                  <a:pt x="1153090" y="0"/>
+                </a:lnTo>
+                <a:lnTo>
+                  <a:pt x="1153090" y="220090"/>
+                </a:lnTo>
+                <a:lnTo>
+                  <a:pt x="0" y="220090"/>
+                </a:lnTo>
+                <a:lnTo>
+                  <a:pt x="0" y="0"/>
+                </a:lnTo>
+                <a:close/>
+              </a:path>
+            </a:pathLst>
+          </a:custGeom>
+          <a:blipFill>
+            <a:blip r:embed="rId4"/>
+            <a:stretch>
+              <a:fillRect l="-2837" t="-400" r="-5891"/>
+            </a:stretch>
+          </a:blipFill>
+        </p:spPr>
+        <p:txBody>
+          <a:bodyPr/>
+          <a:lstStyle/>
+          <a:p>
+            <a:endParaRPr lang="pt-BR" sz="700"/>
+          </a:p>
+        </p:txBody>
+      </p:sp>
+      <p:sp>
+        <p:nvSpPr>
+          <p:cNvPr id="182" name="Freeform 14">
+            <a:extLst>
+              <a:ext uri="{FF2B5EF4-FFF2-40B4-BE49-F238E27FC236}">
+                <a16:creationId xmlns:a16="http://schemas.microsoft.com/office/drawing/2014/main" id="{D944E4C8-F697-DD15-F1F6-6341E68CC1E1}"/>
+              </a:ext>
+            </a:extLst>
+          </p:cNvPr>
+          <p:cNvSpPr/>
+          <p:nvPr/>
+        </p:nvSpPr>
+        <p:spPr>
+          <a:xfrm>
+            <a:off x="1350913" y="3596171"/>
+            <a:ext cx="736783" cy="521888"/>
+          </a:xfrm>
+          <a:custGeom>
+            <a:avLst/>
+            <a:gdLst/>
+            <a:ahLst/>
+            <a:cxnLst/>
+            <a:rect l="l" t="t" r="r" b="b"/>
+            <a:pathLst>
+              <a:path w="1473565" h="1043775">
+                <a:moveTo>
+                  <a:pt x="0" y="0"/>
+                </a:moveTo>
+                <a:lnTo>
+                  <a:pt x="1473565" y="0"/>
+                </a:lnTo>
+                <a:lnTo>
+                  <a:pt x="1473565" y="1043775"/>
+                </a:lnTo>
+                <a:lnTo>
+                  <a:pt x="0" y="1043775"/>
+                </a:lnTo>
+                <a:lnTo>
+                  <a:pt x="0" y="0"/>
+                </a:lnTo>
+                <a:close/>
+              </a:path>
+            </a:pathLst>
+          </a:custGeom>
+          <a:blipFill>
+            <a:blip r:embed="rId5"/>
+            <a:stretch>
+              <a:fillRect/>
+            </a:stretch>
+          </a:blipFill>
+        </p:spPr>
+        <p:txBody>
+          <a:bodyPr/>
+          <a:lstStyle/>
+          <a:p>
+            <a:endParaRPr lang="pt-BR" sz="700"/>
+          </a:p>
+        </p:txBody>
+      </p:sp>
+      <p:sp>
+        <p:nvSpPr>
+          <p:cNvPr id="183" name="Freeform 15">
+            <a:extLst>
+              <a:ext uri="{FF2B5EF4-FFF2-40B4-BE49-F238E27FC236}">
+                <a16:creationId xmlns:a16="http://schemas.microsoft.com/office/drawing/2014/main" id="{E0B213B6-09E5-54D6-58C3-CCD082EC5C6D}"/>
+              </a:ext>
+            </a:extLst>
+          </p:cNvPr>
+          <p:cNvSpPr/>
+          <p:nvPr/>
+        </p:nvSpPr>
+        <p:spPr>
+          <a:xfrm>
+            <a:off x="1618290" y="2824536"/>
+            <a:ext cx="202028" cy="771636"/>
+          </a:xfrm>
+          <a:custGeom>
+            <a:avLst/>
+            <a:gdLst/>
+            <a:ahLst/>
+            <a:cxnLst/>
+            <a:rect l="l" t="t" r="r" b="b"/>
+            <a:pathLst>
+              <a:path w="404056" h="1543271">
+                <a:moveTo>
+                  <a:pt x="0" y="0"/>
+                </a:moveTo>
+                <a:lnTo>
+                  <a:pt x="404057" y="0"/>
+                </a:lnTo>
+                <a:lnTo>
+                  <a:pt x="404057" y="1543271"/>
+                </a:lnTo>
+                <a:lnTo>
+                  <a:pt x="0" y="1543271"/>
+                </a:lnTo>
+                <a:lnTo>
+                  <a:pt x="0" y="0"/>
+                </a:lnTo>
+                <a:close/>
+              </a:path>
+            </a:pathLst>
+          </a:custGeom>
+          <a:blipFill>
+            <a:blip r:embed="rId6">
+              <a:extLst>
+                <a:ext uri="{96DAC541-7B7A-43D3-8B79-37D633B846F1}">
+                  <asvg:svgBlip xmlns:asvg="http://schemas.microsoft.com/office/drawing/2016/SVG/main" r:embed="rId7"/>
+                </a:ext>
+              </a:extLst>
+            </a:blip>
+            <a:stretch>
+              <a:fillRect/>
+            </a:stretch>
+          </a:blipFill>
+        </p:spPr>
+        <p:txBody>
+          <a:bodyPr/>
+          <a:lstStyle/>
+          <a:p>
+            <a:endParaRPr lang="pt-BR" sz="700"/>
+          </a:p>
+        </p:txBody>
+      </p:sp>
+      <p:sp>
+        <p:nvSpPr>
+          <p:cNvPr id="184" name="Freeform 16">
+            <a:extLst>
+              <a:ext uri="{FF2B5EF4-FFF2-40B4-BE49-F238E27FC236}">
+                <a16:creationId xmlns:a16="http://schemas.microsoft.com/office/drawing/2014/main" id="{06F7E27A-A790-285E-524C-186F64CF79A1}"/>
+              </a:ext>
+            </a:extLst>
+          </p:cNvPr>
+          <p:cNvSpPr/>
+          <p:nvPr/>
+        </p:nvSpPr>
+        <p:spPr>
+          <a:xfrm>
+            <a:off x="1013211" y="1661895"/>
+            <a:ext cx="1438604" cy="1162641"/>
+          </a:xfrm>
+          <a:custGeom>
+            <a:avLst/>
+            <a:gdLst/>
+            <a:ahLst/>
+            <a:cxnLst/>
+            <a:rect l="l" t="t" r="r" b="b"/>
+            <a:pathLst>
+              <a:path w="2877207" h="2325281">
+                <a:moveTo>
+                  <a:pt x="0" y="0"/>
+                </a:moveTo>
+                <a:lnTo>
+                  <a:pt x="2877208" y="0"/>
+                </a:lnTo>
+                <a:lnTo>
+                  <a:pt x="2877208" y="2325281"/>
+                </a:lnTo>
+                <a:lnTo>
+                  <a:pt x="0" y="2325281"/>
+                </a:lnTo>
+                <a:lnTo>
+                  <a:pt x="0" y="0"/>
+                </a:lnTo>
+                <a:close/>
+              </a:path>
+            </a:pathLst>
+          </a:custGeom>
+          <a:blipFill>
+            <a:blip r:embed="rId8"/>
+            <a:stretch>
+              <a:fillRect l="-11149" t="-8207" r="-9486" b="-8810"/>
+            </a:stretch>
+          </a:blipFill>
+        </p:spPr>
+        <p:txBody>
+          <a:bodyPr/>
+          <a:lstStyle/>
+          <a:p>
+            <a:endParaRPr lang="pt-BR" sz="700"/>
+          </a:p>
+        </p:txBody>
+      </p:sp>
+      <p:grpSp>
+        <p:nvGrpSpPr>
+          <p:cNvPr id="185" name="Group 17">
+            <a:extLst>
+              <a:ext uri="{FF2B5EF4-FFF2-40B4-BE49-F238E27FC236}">
+                <a16:creationId xmlns:a16="http://schemas.microsoft.com/office/drawing/2014/main" id="{10D2C90C-51E9-0BA6-0D4D-F1698CDF3123}"/>
+              </a:ext>
+            </a:extLst>
+          </p:cNvPr>
+          <p:cNvGrpSpPr/>
+          <p:nvPr/>
+        </p:nvGrpSpPr>
+        <p:grpSpPr>
+          <a:xfrm>
+            <a:off x="1270025" y="1836764"/>
+            <a:ext cx="746492" cy="433756"/>
+            <a:chOff x="0" y="0"/>
+            <a:chExt cx="635527" cy="369278"/>
+          </a:xfrm>
+        </p:grpSpPr>
+        <p:sp>
+          <p:nvSpPr>
+            <p:cNvPr id="186" name="Freeform 18">
+              <a:extLst>
+                <a:ext uri="{FF2B5EF4-FFF2-40B4-BE49-F238E27FC236}">
+                  <a16:creationId xmlns:a16="http://schemas.microsoft.com/office/drawing/2014/main" id="{EA2D38DF-CD8C-915E-A533-7F5AE9A5F89E}"/>
+                </a:ext>
+              </a:extLst>
+            </p:cNvPr>
+            <p:cNvSpPr/>
+            <p:nvPr/>
+          </p:nvSpPr>
+          <p:spPr>
+            <a:xfrm>
+              <a:off x="0" y="0"/>
+              <a:ext cx="635527" cy="369278"/>
+            </a:xfrm>
+            <a:custGeom>
+              <a:avLst/>
+              <a:gdLst/>
+              <a:ahLst/>
+              <a:cxnLst/>
+              <a:rect l="l" t="t" r="r" b="b"/>
+              <a:pathLst>
+                <a:path w="635527" h="369278">
+                  <a:moveTo>
+                    <a:pt x="0" y="0"/>
+                  </a:moveTo>
+                  <a:lnTo>
+                    <a:pt x="635527" y="0"/>
+                  </a:lnTo>
+                  <a:lnTo>
+                    <a:pt x="635527" y="369278"/>
+                  </a:lnTo>
+                  <a:lnTo>
+                    <a:pt x="0" y="369278"/>
+                  </a:lnTo>
+                  <a:close/>
+                </a:path>
+              </a:pathLst>
+            </a:custGeom>
+            <a:solidFill>
+              <a:srgbClr val="FFFFFF"/>
+            </a:solidFill>
+          </p:spPr>
+          <p:txBody>
+            <a:bodyPr/>
+            <a:lstStyle/>
+            <a:p>
+              <a:endParaRPr lang="pt-BR" sz="700"/>
+            </a:p>
+          </p:txBody>
+        </p:sp>
+        <p:sp>
+          <p:nvSpPr>
+            <p:cNvPr id="187" name="TextBox 19">
+              <a:extLst>
+                <a:ext uri="{FF2B5EF4-FFF2-40B4-BE49-F238E27FC236}">
+                  <a16:creationId xmlns:a16="http://schemas.microsoft.com/office/drawing/2014/main" id="{0C514C35-E7CB-BBCE-2386-54D5169DF0CE}"/>
+                </a:ext>
+              </a:extLst>
+            </p:cNvPr>
+            <p:cNvSpPr txBox="1"/>
+            <p:nvPr/>
+          </p:nvSpPr>
+          <p:spPr>
+            <a:xfrm>
+              <a:off x="0" y="-38100"/>
+              <a:ext cx="635527" cy="407378"/>
+            </a:xfrm>
+            <a:prstGeom prst="rect">
+              <a:avLst/>
+            </a:prstGeom>
+          </p:spPr>
+          <p:txBody>
+            <a:bodyPr lIns="19574" tIns="19574" rIns="19574" bIns="19574" rtlCol="0" anchor="ctr"/>
+            <a:lstStyle/>
+            <a:p>
+              <a:pPr marL="213921" lvl="1" indent="-106961" algn="ctr">
+                <a:lnSpc>
+                  <a:spcPts val="1387"/>
+                </a:lnSpc>
+                <a:buAutoNum type="arabicPeriod"/>
+              </a:pPr>
+              <a:endParaRPr sz="700"/>
+            </a:p>
+          </p:txBody>
+        </p:sp>
+      </p:grpSp>
+      <p:grpSp>
+        <p:nvGrpSpPr>
+          <p:cNvPr id="188" name="Group 20">
+            <a:extLst>
+              <a:ext uri="{FF2B5EF4-FFF2-40B4-BE49-F238E27FC236}">
+                <a16:creationId xmlns:a16="http://schemas.microsoft.com/office/drawing/2014/main" id="{CD278F50-E11A-D8C6-5F33-1F687CC8EDCA}"/>
+              </a:ext>
+            </a:extLst>
+          </p:cNvPr>
+          <p:cNvGrpSpPr/>
+          <p:nvPr/>
+        </p:nvGrpSpPr>
+        <p:grpSpPr>
+          <a:xfrm>
+            <a:off x="1270025" y="1806787"/>
+            <a:ext cx="924977" cy="554061"/>
+            <a:chOff x="0" y="0"/>
+            <a:chExt cx="944127" cy="565532"/>
+          </a:xfrm>
+        </p:grpSpPr>
+        <p:sp>
+          <p:nvSpPr>
+            <p:cNvPr id="189" name="Freeform 21">
+              <a:extLst>
+                <a:ext uri="{FF2B5EF4-FFF2-40B4-BE49-F238E27FC236}">
+                  <a16:creationId xmlns:a16="http://schemas.microsoft.com/office/drawing/2014/main" id="{A4459B44-5470-FB99-1F73-C796321E8109}"/>
+                </a:ext>
+              </a:extLst>
+            </p:cNvPr>
+            <p:cNvSpPr/>
+            <p:nvPr/>
+          </p:nvSpPr>
+          <p:spPr>
+            <a:xfrm>
+              <a:off x="0" y="0"/>
+              <a:ext cx="944127" cy="565532"/>
+            </a:xfrm>
+            <a:custGeom>
+              <a:avLst/>
+              <a:gdLst/>
+              <a:ahLst/>
+              <a:cxnLst/>
+              <a:rect l="l" t="t" r="r" b="b"/>
+              <a:pathLst>
+                <a:path w="944127" h="565532">
+                  <a:moveTo>
+                    <a:pt x="0" y="0"/>
+                  </a:moveTo>
+                  <a:lnTo>
+                    <a:pt x="944127" y="0"/>
+                  </a:lnTo>
+                  <a:lnTo>
+                    <a:pt x="944127" y="565532"/>
+                  </a:lnTo>
+                  <a:lnTo>
+                    <a:pt x="0" y="565532"/>
+                  </a:lnTo>
+                  <a:close/>
+                </a:path>
+              </a:pathLst>
+            </a:custGeom>
+            <a:solidFill>
+              <a:srgbClr val="FFFFFF"/>
+            </a:solidFill>
+            <a:ln w="47625" cap="sq">
+              <a:solidFill>
+                <a:srgbClr val="000000"/>
+              </a:solidFill>
+              <a:prstDash val="solid"/>
+              <a:miter/>
+            </a:ln>
+          </p:spPr>
+          <p:txBody>
+            <a:bodyPr/>
+            <a:lstStyle/>
+            <a:p>
+              <a:endParaRPr lang="pt-BR" sz="700"/>
+            </a:p>
+          </p:txBody>
+        </p:sp>
+        <p:sp>
+          <p:nvSpPr>
+            <p:cNvPr id="190" name="TextBox 22">
+              <a:extLst>
+                <a:ext uri="{FF2B5EF4-FFF2-40B4-BE49-F238E27FC236}">
+                  <a16:creationId xmlns:a16="http://schemas.microsoft.com/office/drawing/2014/main" id="{66BDBCB7-9447-348A-DCD3-D043913B8048}"/>
+                </a:ext>
+              </a:extLst>
+            </p:cNvPr>
+            <p:cNvSpPr txBox="1"/>
+            <p:nvPr/>
+          </p:nvSpPr>
+          <p:spPr>
+            <a:xfrm>
+              <a:off x="0" y="-28575"/>
+              <a:ext cx="944127" cy="594107"/>
+            </a:xfrm>
+            <a:prstGeom prst="rect">
+              <a:avLst/>
+            </a:prstGeom>
+          </p:spPr>
+          <p:txBody>
+            <a:bodyPr lIns="19574" tIns="19574" rIns="19574" bIns="19574" rtlCol="0" anchor="ctr"/>
+            <a:lstStyle/>
+            <a:p>
+              <a:pPr marL="158058" lvl="1" indent="-79029" algn="ctr">
+                <a:lnSpc>
+                  <a:spcPts val="1025"/>
+                </a:lnSpc>
+                <a:buAutoNum type="arabicPeriod"/>
+              </a:pPr>
+              <a:endParaRPr sz="700"/>
+            </a:p>
+          </p:txBody>
+        </p:sp>
+      </p:grpSp>
+      <p:sp>
+        <p:nvSpPr>
+          <p:cNvPr id="191" name="Freeform 23">
+            <a:extLst>
+              <a:ext uri="{FF2B5EF4-FFF2-40B4-BE49-F238E27FC236}">
+                <a16:creationId xmlns:a16="http://schemas.microsoft.com/office/drawing/2014/main" id="{29EBF8DA-AEA1-50B1-9B0B-A67D0B4BE944}"/>
+              </a:ext>
+            </a:extLst>
+          </p:cNvPr>
+          <p:cNvSpPr/>
+          <p:nvPr/>
+        </p:nvSpPr>
+        <p:spPr>
+          <a:xfrm>
+            <a:off x="1551275" y="1934461"/>
+            <a:ext cx="336059" cy="336059"/>
+          </a:xfrm>
+          <a:custGeom>
+            <a:avLst/>
+            <a:gdLst/>
+            <a:ahLst/>
+            <a:cxnLst/>
+            <a:rect l="l" t="t" r="r" b="b"/>
+            <a:pathLst>
+              <a:path w="672118" h="672118">
+                <a:moveTo>
+                  <a:pt x="0" y="0"/>
+                </a:moveTo>
+                <a:lnTo>
+                  <a:pt x="672117" y="0"/>
+                </a:lnTo>
+                <a:lnTo>
+                  <a:pt x="672117" y="672117"/>
+                </a:lnTo>
+                <a:lnTo>
+                  <a:pt x="0" y="672117"/>
+                </a:lnTo>
+                <a:lnTo>
+                  <a:pt x="0" y="0"/>
+                </a:lnTo>
+                <a:close/>
+              </a:path>
+            </a:pathLst>
+          </a:custGeom>
+          <a:blipFill>
+            <a:blip r:embed="rId9"/>
+            <a:stretch>
+              <a:fillRect/>
+            </a:stretch>
+          </a:blipFill>
+        </p:spPr>
+        <p:txBody>
+          <a:bodyPr/>
+          <a:lstStyle/>
+          <a:p>
+            <a:endParaRPr lang="pt-BR" sz="700"/>
+          </a:p>
+        </p:txBody>
+      </p:sp>
+      <p:sp>
+        <p:nvSpPr>
+          <p:cNvPr id="192" name="AutoShape 24">
+            <a:extLst>
+              <a:ext uri="{FF2B5EF4-FFF2-40B4-BE49-F238E27FC236}">
+                <a16:creationId xmlns:a16="http://schemas.microsoft.com/office/drawing/2014/main" id="{E3F9E1C9-45B5-B762-9EA7-749CA1DAEF15}"/>
+              </a:ext>
+            </a:extLst>
+          </p:cNvPr>
+          <p:cNvSpPr/>
+          <p:nvPr/>
+        </p:nvSpPr>
+        <p:spPr>
+          <a:xfrm flipH="1" flipV="1">
+            <a:off x="1535268" y="1402278"/>
+            <a:ext cx="184037" cy="532184"/>
+          </a:xfrm>
+          <a:prstGeom prst="line">
+            <a:avLst/>
+          </a:prstGeom>
+          <a:ln w="47625" cap="flat">
+            <a:solidFill>
+              <a:srgbClr val="EB2727"/>
+            </a:solidFill>
+            <a:prstDash val="solid"/>
+            <a:headEnd type="none" w="sm" len="sm"/>
+            <a:tailEnd type="arrow" w="med" len="sm"/>
+          </a:ln>
+        </p:spPr>
+        <p:txBody>
+          <a:bodyPr/>
+          <a:lstStyle/>
+          <a:p>
+            <a:endParaRPr lang="pt-BR" sz="700"/>
+          </a:p>
+        </p:txBody>
+      </p:sp>
+      <p:sp>
+        <p:nvSpPr>
+          <p:cNvPr id="193" name="Freeform 25">
+            <a:extLst>
+              <a:ext uri="{FF2B5EF4-FFF2-40B4-BE49-F238E27FC236}">
+                <a16:creationId xmlns:a16="http://schemas.microsoft.com/office/drawing/2014/main" id="{FCCD246E-F759-8C8B-863D-D99FCD8D3E9B}"/>
+              </a:ext>
+            </a:extLst>
+          </p:cNvPr>
+          <p:cNvSpPr/>
+          <p:nvPr/>
+        </p:nvSpPr>
+        <p:spPr>
+          <a:xfrm>
+            <a:off x="3610473" y="1646600"/>
+            <a:ext cx="1438604" cy="1162641"/>
+          </a:xfrm>
+          <a:custGeom>
+            <a:avLst/>
+            <a:gdLst/>
+            <a:ahLst/>
+            <a:cxnLst/>
+            <a:rect l="l" t="t" r="r" b="b"/>
+            <a:pathLst>
+              <a:path w="2877207" h="2325281">
+                <a:moveTo>
+                  <a:pt x="0" y="0"/>
+                </a:moveTo>
+                <a:lnTo>
+                  <a:pt x="2877207" y="0"/>
+                </a:lnTo>
+                <a:lnTo>
+                  <a:pt x="2877207" y="2325280"/>
+                </a:lnTo>
+                <a:lnTo>
+                  <a:pt x="0" y="2325280"/>
+                </a:lnTo>
+                <a:lnTo>
+                  <a:pt x="0" y="0"/>
+                </a:lnTo>
+                <a:close/>
+              </a:path>
+            </a:pathLst>
+          </a:custGeom>
+          <a:blipFill>
+            <a:blip r:embed="rId8"/>
+            <a:stretch>
+              <a:fillRect l="-11149" t="-8207" r="-9486" b="-8810"/>
+            </a:stretch>
+          </a:blipFill>
+        </p:spPr>
+        <p:txBody>
+          <a:bodyPr/>
+          <a:lstStyle/>
+          <a:p>
+            <a:endParaRPr lang="pt-BR" sz="700"/>
+          </a:p>
+        </p:txBody>
+      </p:sp>
+      <p:grpSp>
+        <p:nvGrpSpPr>
+          <p:cNvPr id="194" name="Group 26">
+            <a:extLst>
+              <a:ext uri="{FF2B5EF4-FFF2-40B4-BE49-F238E27FC236}">
+                <a16:creationId xmlns:a16="http://schemas.microsoft.com/office/drawing/2014/main" id="{181116F0-01FB-EC11-7F6B-C7F71DA18F7D}"/>
+              </a:ext>
+            </a:extLst>
+          </p:cNvPr>
+          <p:cNvGrpSpPr/>
+          <p:nvPr/>
+        </p:nvGrpSpPr>
+        <p:grpSpPr>
+          <a:xfrm>
+            <a:off x="3867286" y="1821469"/>
+            <a:ext cx="746492" cy="433756"/>
+            <a:chOff x="0" y="0"/>
+            <a:chExt cx="635527" cy="369278"/>
+          </a:xfrm>
+        </p:grpSpPr>
+        <p:sp>
+          <p:nvSpPr>
+            <p:cNvPr id="195" name="Freeform 27">
+              <a:extLst>
+                <a:ext uri="{FF2B5EF4-FFF2-40B4-BE49-F238E27FC236}">
+                  <a16:creationId xmlns:a16="http://schemas.microsoft.com/office/drawing/2014/main" id="{70E2FB29-068D-8276-DEB4-2B551FF39076}"/>
+                </a:ext>
+              </a:extLst>
+            </p:cNvPr>
+            <p:cNvSpPr/>
+            <p:nvPr/>
+          </p:nvSpPr>
+          <p:spPr>
+            <a:xfrm>
+              <a:off x="0" y="0"/>
+              <a:ext cx="635527" cy="369278"/>
+            </a:xfrm>
+            <a:custGeom>
+              <a:avLst/>
+              <a:gdLst/>
+              <a:ahLst/>
+              <a:cxnLst/>
+              <a:rect l="l" t="t" r="r" b="b"/>
+              <a:pathLst>
+                <a:path w="635527" h="369278">
+                  <a:moveTo>
+                    <a:pt x="0" y="0"/>
+                  </a:moveTo>
+                  <a:lnTo>
+                    <a:pt x="635527" y="0"/>
+                  </a:lnTo>
+                  <a:lnTo>
+                    <a:pt x="635527" y="369278"/>
+                  </a:lnTo>
+                  <a:lnTo>
+                    <a:pt x="0" y="369278"/>
+                  </a:lnTo>
+                  <a:close/>
+                </a:path>
+              </a:pathLst>
+            </a:custGeom>
+            <a:solidFill>
+              <a:srgbClr val="FFFFFF"/>
+            </a:solidFill>
+          </p:spPr>
+          <p:txBody>
+            <a:bodyPr/>
+            <a:lstStyle/>
+            <a:p>
+              <a:endParaRPr lang="pt-BR" sz="700"/>
+            </a:p>
+          </p:txBody>
+        </p:sp>
+        <p:sp>
+          <p:nvSpPr>
+            <p:cNvPr id="196" name="TextBox 28">
+              <a:extLst>
+                <a:ext uri="{FF2B5EF4-FFF2-40B4-BE49-F238E27FC236}">
+                  <a16:creationId xmlns:a16="http://schemas.microsoft.com/office/drawing/2014/main" id="{7F19947C-ECD6-8DC3-8DAB-3E29B0BCEB3F}"/>
+                </a:ext>
+              </a:extLst>
+            </p:cNvPr>
+            <p:cNvSpPr txBox="1"/>
+            <p:nvPr/>
+          </p:nvSpPr>
+          <p:spPr>
+            <a:xfrm>
+              <a:off x="0" y="-38100"/>
+              <a:ext cx="635527" cy="407378"/>
+            </a:xfrm>
+            <a:prstGeom prst="rect">
+              <a:avLst/>
+            </a:prstGeom>
+          </p:spPr>
+          <p:txBody>
+            <a:bodyPr lIns="19574" tIns="19574" rIns="19574" bIns="19574" rtlCol="0" anchor="ctr"/>
+            <a:lstStyle/>
+            <a:p>
+              <a:pPr marL="213921" lvl="1" indent="-106961" algn="ctr">
+                <a:lnSpc>
+                  <a:spcPts val="1387"/>
+                </a:lnSpc>
+                <a:buAutoNum type="arabicPeriod"/>
+              </a:pPr>
+              <a:endParaRPr sz="700"/>
+            </a:p>
+          </p:txBody>
+        </p:sp>
+      </p:grpSp>
+      <p:grpSp>
+        <p:nvGrpSpPr>
+          <p:cNvPr id="197" name="Group 29">
+            <a:extLst>
+              <a:ext uri="{FF2B5EF4-FFF2-40B4-BE49-F238E27FC236}">
+                <a16:creationId xmlns:a16="http://schemas.microsoft.com/office/drawing/2014/main" id="{34388F7A-19B1-E719-2414-3C14309D6D10}"/>
+              </a:ext>
+            </a:extLst>
+          </p:cNvPr>
+          <p:cNvGrpSpPr/>
+          <p:nvPr/>
+        </p:nvGrpSpPr>
+        <p:grpSpPr>
+          <a:xfrm>
+            <a:off x="3867286" y="1791492"/>
+            <a:ext cx="924977" cy="554061"/>
+            <a:chOff x="0" y="0"/>
+            <a:chExt cx="944127" cy="565532"/>
+          </a:xfrm>
+        </p:grpSpPr>
+        <p:sp>
+          <p:nvSpPr>
+            <p:cNvPr id="198" name="Freeform 30">
+              <a:extLst>
+                <a:ext uri="{FF2B5EF4-FFF2-40B4-BE49-F238E27FC236}">
+                  <a16:creationId xmlns:a16="http://schemas.microsoft.com/office/drawing/2014/main" id="{0A82903F-97E6-33CE-CEB6-DC0EDB20EED8}"/>
+                </a:ext>
+              </a:extLst>
+            </p:cNvPr>
+            <p:cNvSpPr/>
+            <p:nvPr/>
+          </p:nvSpPr>
+          <p:spPr>
+            <a:xfrm>
+              <a:off x="0" y="0"/>
+              <a:ext cx="944127" cy="565532"/>
+            </a:xfrm>
+            <a:custGeom>
+              <a:avLst/>
+              <a:gdLst/>
+              <a:ahLst/>
+              <a:cxnLst/>
+              <a:rect l="l" t="t" r="r" b="b"/>
+              <a:pathLst>
+                <a:path w="944127" h="565532">
+                  <a:moveTo>
+                    <a:pt x="0" y="0"/>
+                  </a:moveTo>
+                  <a:lnTo>
+                    <a:pt x="944127" y="0"/>
+                  </a:lnTo>
+                  <a:lnTo>
+                    <a:pt x="944127" y="565532"/>
+                  </a:lnTo>
+                  <a:lnTo>
+                    <a:pt x="0" y="565532"/>
+                  </a:lnTo>
+                  <a:close/>
+                </a:path>
+              </a:pathLst>
+            </a:custGeom>
+            <a:solidFill>
+              <a:srgbClr val="FFFFFF"/>
+            </a:solidFill>
+            <a:ln w="47625" cap="sq">
+              <a:solidFill>
+                <a:srgbClr val="000000"/>
+              </a:solidFill>
+              <a:prstDash val="solid"/>
+              <a:miter/>
+            </a:ln>
+          </p:spPr>
+          <p:txBody>
+            <a:bodyPr/>
+            <a:lstStyle/>
+            <a:p>
+              <a:endParaRPr lang="pt-BR" sz="700"/>
+            </a:p>
+          </p:txBody>
+        </p:sp>
+        <p:sp>
+          <p:nvSpPr>
+            <p:cNvPr id="199" name="TextBox 31">
+              <a:extLst>
+                <a:ext uri="{FF2B5EF4-FFF2-40B4-BE49-F238E27FC236}">
+                  <a16:creationId xmlns:a16="http://schemas.microsoft.com/office/drawing/2014/main" id="{BA41D4CA-30DE-6F85-67D4-68F2882AD527}"/>
+                </a:ext>
+              </a:extLst>
+            </p:cNvPr>
+            <p:cNvSpPr txBox="1"/>
+            <p:nvPr/>
+          </p:nvSpPr>
+          <p:spPr>
+            <a:xfrm>
+              <a:off x="0" y="-28575"/>
+              <a:ext cx="944127" cy="594107"/>
+            </a:xfrm>
+            <a:prstGeom prst="rect">
+              <a:avLst/>
+            </a:prstGeom>
+          </p:spPr>
+          <p:txBody>
+            <a:bodyPr lIns="19574" tIns="19574" rIns="19574" bIns="19574" rtlCol="0" anchor="ctr"/>
+            <a:lstStyle/>
+            <a:p>
+              <a:pPr marL="158058" lvl="1" indent="-79029" algn="ctr">
+                <a:lnSpc>
+                  <a:spcPts val="1025"/>
+                </a:lnSpc>
+                <a:buAutoNum type="arabicPeriod"/>
+              </a:pPr>
+              <a:endParaRPr sz="700"/>
+            </a:p>
+          </p:txBody>
+        </p:sp>
+      </p:grpSp>
+      <p:grpSp>
+        <p:nvGrpSpPr>
+          <p:cNvPr id="200" name="Group 32">
+            <a:extLst>
+              <a:ext uri="{FF2B5EF4-FFF2-40B4-BE49-F238E27FC236}">
+                <a16:creationId xmlns:a16="http://schemas.microsoft.com/office/drawing/2014/main" id="{3EF8AC93-D4B0-EED2-2B8A-4E18F36DBCAA}"/>
+              </a:ext>
+            </a:extLst>
+          </p:cNvPr>
+          <p:cNvGrpSpPr/>
+          <p:nvPr/>
+        </p:nvGrpSpPr>
+        <p:grpSpPr>
+          <a:xfrm>
+            <a:off x="3889670" y="1821469"/>
+            <a:ext cx="444129" cy="481631"/>
+            <a:chOff x="0" y="0"/>
+            <a:chExt cx="812800" cy="881432"/>
+          </a:xfrm>
+        </p:grpSpPr>
+        <p:sp>
+          <p:nvSpPr>
+            <p:cNvPr id="201" name="Freeform 33">
+              <a:extLst>
+                <a:ext uri="{FF2B5EF4-FFF2-40B4-BE49-F238E27FC236}">
+                  <a16:creationId xmlns:a16="http://schemas.microsoft.com/office/drawing/2014/main" id="{40CC188D-2410-6D14-0C4B-9637FD7687DE}"/>
+                </a:ext>
+              </a:extLst>
+            </p:cNvPr>
+            <p:cNvSpPr/>
+            <p:nvPr/>
+          </p:nvSpPr>
+          <p:spPr>
+            <a:xfrm>
+              <a:off x="0" y="0"/>
+              <a:ext cx="812800" cy="881432"/>
+            </a:xfrm>
+            <a:custGeom>
+              <a:avLst/>
+              <a:gdLst/>
+              <a:ahLst/>
+              <a:cxnLst/>
+              <a:rect l="l" t="t" r="r" b="b"/>
+              <a:pathLst>
+                <a:path w="812800" h="881432">
+                  <a:moveTo>
+                    <a:pt x="0" y="0"/>
+                  </a:moveTo>
+                  <a:lnTo>
+                    <a:pt x="812800" y="0"/>
+                  </a:lnTo>
+                  <a:lnTo>
+                    <a:pt x="812800" y="881432"/>
+                  </a:lnTo>
+                  <a:lnTo>
+                    <a:pt x="0" y="881432"/>
+                  </a:lnTo>
+                  <a:close/>
+                </a:path>
+              </a:pathLst>
+            </a:custGeom>
+            <a:solidFill>
+              <a:srgbClr val="FFFFFF"/>
+            </a:solidFill>
+            <a:ln w="19050" cap="sq">
+              <a:solidFill>
+                <a:srgbClr val="EB2727"/>
+              </a:solidFill>
+              <a:prstDash val="dash"/>
+              <a:miter/>
+            </a:ln>
+          </p:spPr>
+          <p:txBody>
+            <a:bodyPr/>
+            <a:lstStyle/>
+            <a:p>
+              <a:endParaRPr lang="pt-BR" sz="700"/>
+            </a:p>
+          </p:txBody>
+        </p:sp>
+        <p:sp>
+          <p:nvSpPr>
+            <p:cNvPr id="202" name="TextBox 34">
+              <a:extLst>
+                <a:ext uri="{FF2B5EF4-FFF2-40B4-BE49-F238E27FC236}">
+                  <a16:creationId xmlns:a16="http://schemas.microsoft.com/office/drawing/2014/main" id="{1353F863-FB85-ABF7-962E-35B5F8544477}"/>
+                </a:ext>
+              </a:extLst>
+            </p:cNvPr>
+            <p:cNvSpPr txBox="1"/>
+            <p:nvPr/>
+          </p:nvSpPr>
+          <p:spPr>
+            <a:xfrm>
+              <a:off x="0" y="-28575"/>
+              <a:ext cx="812800" cy="910007"/>
+            </a:xfrm>
+            <a:prstGeom prst="rect">
+              <a:avLst/>
+            </a:prstGeom>
+          </p:spPr>
+          <p:txBody>
+            <a:bodyPr lIns="19574" tIns="19574" rIns="19574" bIns="19574" rtlCol="0" anchor="ctr"/>
+            <a:lstStyle/>
+            <a:p>
+              <a:pPr algn="ctr">
+                <a:lnSpc>
+                  <a:spcPts val="973"/>
+                </a:lnSpc>
+              </a:pPr>
+              <a:endParaRPr sz="700"/>
+            </a:p>
+          </p:txBody>
+        </p:sp>
+      </p:grpSp>
+      <p:sp>
+        <p:nvSpPr>
+          <p:cNvPr id="203" name="Freeform 35">
+            <a:extLst>
+              <a:ext uri="{FF2B5EF4-FFF2-40B4-BE49-F238E27FC236}">
+                <a16:creationId xmlns:a16="http://schemas.microsoft.com/office/drawing/2014/main" id="{DC49C234-1E11-B79E-A9E0-0F930709AC31}"/>
+              </a:ext>
+            </a:extLst>
+          </p:cNvPr>
+          <p:cNvSpPr/>
+          <p:nvPr/>
+        </p:nvSpPr>
+        <p:spPr>
+          <a:xfrm>
+            <a:off x="4226181" y="1832876"/>
+            <a:ext cx="192169" cy="210046"/>
+          </a:xfrm>
+          <a:custGeom>
+            <a:avLst/>
+            <a:gdLst/>
+            <a:ahLst/>
+            <a:cxnLst/>
+            <a:rect l="l" t="t" r="r" b="b"/>
+            <a:pathLst>
+              <a:path w="384338" h="420091">
+                <a:moveTo>
+                  <a:pt x="0" y="0"/>
+                </a:moveTo>
+                <a:lnTo>
+                  <a:pt x="384339" y="0"/>
+                </a:lnTo>
+                <a:lnTo>
+                  <a:pt x="384339" y="420091"/>
+                </a:lnTo>
+                <a:lnTo>
+                  <a:pt x="0" y="420091"/>
+                </a:lnTo>
+                <a:lnTo>
+                  <a:pt x="0" y="0"/>
+                </a:lnTo>
+                <a:close/>
+              </a:path>
+            </a:pathLst>
+          </a:custGeom>
+          <a:blipFill>
+            <a:blip r:embed="rId10"/>
+            <a:stretch>
+              <a:fillRect l="-92227" t="-12448" r="-92372" b="-34148"/>
+            </a:stretch>
+          </a:blipFill>
+        </p:spPr>
+        <p:txBody>
+          <a:bodyPr/>
+          <a:lstStyle/>
+          <a:p>
+            <a:endParaRPr lang="pt-BR" sz="700"/>
+          </a:p>
+        </p:txBody>
+      </p:sp>
+      <p:sp>
+        <p:nvSpPr>
+          <p:cNvPr id="204" name="Freeform 36">
+            <a:extLst>
+              <a:ext uri="{FF2B5EF4-FFF2-40B4-BE49-F238E27FC236}">
+                <a16:creationId xmlns:a16="http://schemas.microsoft.com/office/drawing/2014/main" id="{39914823-E051-9996-ECBD-ACA444CF0725}"/>
+              </a:ext>
+            </a:extLst>
+          </p:cNvPr>
+          <p:cNvSpPr/>
+          <p:nvPr/>
+        </p:nvSpPr>
+        <p:spPr>
+          <a:xfrm>
+            <a:off x="3945861" y="1881648"/>
+            <a:ext cx="306751" cy="306921"/>
+          </a:xfrm>
+          <a:custGeom>
+            <a:avLst/>
+            <a:gdLst/>
+            <a:ahLst/>
+            <a:cxnLst/>
+            <a:rect l="l" t="t" r="r" b="b"/>
+            <a:pathLst>
+              <a:path w="613501" h="613842">
+                <a:moveTo>
+                  <a:pt x="0" y="0"/>
+                </a:moveTo>
+                <a:lnTo>
+                  <a:pt x="613502" y="0"/>
+                </a:lnTo>
+                <a:lnTo>
+                  <a:pt x="613502" y="613842"/>
+                </a:lnTo>
+                <a:lnTo>
+                  <a:pt x="0" y="613842"/>
+                </a:lnTo>
+                <a:lnTo>
+                  <a:pt x="0" y="0"/>
+                </a:lnTo>
+                <a:close/>
+              </a:path>
+            </a:pathLst>
+          </a:custGeom>
+          <a:blipFill>
+            <a:blip r:embed="rId11"/>
+            <a:stretch>
+              <a:fillRect l="-501" r="-501" b="-946"/>
+            </a:stretch>
+          </a:blipFill>
+        </p:spPr>
+        <p:txBody>
+          <a:bodyPr/>
+          <a:lstStyle/>
+          <a:p>
+            <a:endParaRPr lang="pt-BR" sz="700"/>
+          </a:p>
+        </p:txBody>
+      </p:sp>
+      <p:sp>
+        <p:nvSpPr>
+          <p:cNvPr id="205" name="Freeform 37">
+            <a:extLst>
+              <a:ext uri="{FF2B5EF4-FFF2-40B4-BE49-F238E27FC236}">
+                <a16:creationId xmlns:a16="http://schemas.microsoft.com/office/drawing/2014/main" id="{DDBC3F7F-2425-E5D5-F076-76316E221A41}"/>
+              </a:ext>
+            </a:extLst>
+          </p:cNvPr>
+          <p:cNvSpPr/>
+          <p:nvPr/>
+        </p:nvSpPr>
+        <p:spPr>
+          <a:xfrm>
+            <a:off x="4322266" y="1885227"/>
+            <a:ext cx="469997" cy="369998"/>
+          </a:xfrm>
+          <a:custGeom>
+            <a:avLst/>
+            <a:gdLst/>
+            <a:ahLst/>
+            <a:cxnLst/>
+            <a:rect l="l" t="t" r="r" b="b"/>
+            <a:pathLst>
+              <a:path w="939993" h="739995">
+                <a:moveTo>
+                  <a:pt x="0" y="0"/>
+                </a:moveTo>
+                <a:lnTo>
+                  <a:pt x="939994" y="0"/>
+                </a:lnTo>
+                <a:lnTo>
+                  <a:pt x="939994" y="739995"/>
+                </a:lnTo>
+                <a:lnTo>
+                  <a:pt x="0" y="739995"/>
+                </a:lnTo>
+                <a:lnTo>
+                  <a:pt x="0" y="0"/>
+                </a:lnTo>
+                <a:close/>
+              </a:path>
+            </a:pathLst>
+          </a:custGeom>
+          <a:blipFill>
+            <a:blip r:embed="rId12"/>
+            <a:stretch>
+              <a:fillRect/>
+            </a:stretch>
+          </a:blipFill>
+        </p:spPr>
+        <p:txBody>
+          <a:bodyPr/>
+          <a:lstStyle/>
+          <a:p>
+            <a:endParaRPr lang="pt-BR" sz="700"/>
+          </a:p>
+        </p:txBody>
+      </p:sp>
+      <p:sp>
+        <p:nvSpPr>
+          <p:cNvPr id="206" name="TextBox 38">
+            <a:extLst>
+              <a:ext uri="{FF2B5EF4-FFF2-40B4-BE49-F238E27FC236}">
+                <a16:creationId xmlns:a16="http://schemas.microsoft.com/office/drawing/2014/main" id="{AAAF96F9-037E-8177-849E-E54C2A6F116A}"/>
+              </a:ext>
+            </a:extLst>
+          </p:cNvPr>
+          <p:cNvSpPr txBox="1"/>
+          <p:nvPr/>
+        </p:nvSpPr>
+        <p:spPr>
+          <a:xfrm>
+            <a:off x="5192421" y="1880157"/>
+            <a:ext cx="1474916" cy="489173"/>
+          </a:xfrm>
+          <a:prstGeom prst="rect">
+            <a:avLst/>
+          </a:prstGeom>
+        </p:spPr>
+        <p:txBody>
+          <a:bodyPr lIns="0" tIns="0" rIns="0" bIns="0" rtlCol="0" anchor="t">
+            <a:spAutoFit/>
+          </a:bodyPr>
+          <a:lstStyle/>
+          <a:p>
+            <a:pPr algn="ctr">
+              <a:lnSpc>
+                <a:spcPts val="1300"/>
+              </a:lnSpc>
+            </a:pPr>
+            <a:r>
+              <a:rPr lang="en-US" sz="929">
+                <a:latin typeface="Open Sans"/>
+              </a:rPr>
+              <a:t>Vizualização dos dados de forma dinâmica. Através do Servidor Local. </a:t>
+            </a:r>
+          </a:p>
+        </p:txBody>
+      </p:sp>
+      <p:sp>
+        <p:nvSpPr>
+          <p:cNvPr id="207" name="Freeform 39">
+            <a:extLst>
+              <a:ext uri="{FF2B5EF4-FFF2-40B4-BE49-F238E27FC236}">
+                <a16:creationId xmlns:a16="http://schemas.microsoft.com/office/drawing/2014/main" id="{9BBCB34F-3FAE-2748-B47F-0AA38B9C2FA4}"/>
+              </a:ext>
+            </a:extLst>
+          </p:cNvPr>
+          <p:cNvSpPr/>
+          <p:nvPr/>
+        </p:nvSpPr>
+        <p:spPr>
+          <a:xfrm>
+            <a:off x="5441229" y="2376838"/>
+            <a:ext cx="977302" cy="536828"/>
+          </a:xfrm>
+          <a:custGeom>
+            <a:avLst/>
+            <a:gdLst/>
+            <a:ahLst/>
+            <a:cxnLst/>
+            <a:rect l="l" t="t" r="r" b="b"/>
+            <a:pathLst>
+              <a:path w="1954603" h="1073656">
+                <a:moveTo>
+                  <a:pt x="0" y="0"/>
+                </a:moveTo>
+                <a:lnTo>
+                  <a:pt x="1954603" y="0"/>
+                </a:lnTo>
+                <a:lnTo>
+                  <a:pt x="1954603" y="1073655"/>
+                </a:lnTo>
+                <a:lnTo>
+                  <a:pt x="0" y="1073655"/>
+                </a:lnTo>
+                <a:lnTo>
+                  <a:pt x="0" y="0"/>
+                </a:lnTo>
+                <a:close/>
+              </a:path>
+            </a:pathLst>
+          </a:custGeom>
+          <a:blipFill>
+            <a:blip r:embed="rId13"/>
+            <a:stretch>
+              <a:fillRect l="-7495" r="-7495" b="-6905"/>
+            </a:stretch>
+          </a:blipFill>
+        </p:spPr>
+        <p:txBody>
+          <a:bodyPr/>
+          <a:lstStyle/>
+          <a:p>
+            <a:endParaRPr lang="pt-BR" sz="700"/>
+          </a:p>
+        </p:txBody>
+      </p:sp>
+      <p:sp>
+        <p:nvSpPr>
+          <p:cNvPr id="208" name="AutoShape 40">
+            <a:extLst>
+              <a:ext uri="{FF2B5EF4-FFF2-40B4-BE49-F238E27FC236}">
+                <a16:creationId xmlns:a16="http://schemas.microsoft.com/office/drawing/2014/main" id="{8A303D15-B48A-4437-9717-12CF147F8521}"/>
+              </a:ext>
+            </a:extLst>
+          </p:cNvPr>
+          <p:cNvSpPr/>
+          <p:nvPr/>
+        </p:nvSpPr>
+        <p:spPr>
+          <a:xfrm>
+            <a:off x="4792263" y="2070226"/>
+            <a:ext cx="400159" cy="60426"/>
+          </a:xfrm>
+          <a:prstGeom prst="line">
+            <a:avLst/>
+          </a:prstGeom>
+          <a:ln w="47625" cap="flat">
+            <a:solidFill>
+              <a:srgbClr val="EB2727"/>
+            </a:solidFill>
+            <a:prstDash val="solid"/>
+            <a:headEnd type="none" w="sm" len="sm"/>
+            <a:tailEnd type="arrow" w="med" len="sm"/>
+          </a:ln>
+        </p:spPr>
+        <p:txBody>
+          <a:bodyPr/>
+          <a:lstStyle/>
+          <a:p>
+            <a:endParaRPr lang="pt-BR" sz="700"/>
+          </a:p>
+        </p:txBody>
+      </p:sp>
+      <p:sp>
+        <p:nvSpPr>
+          <p:cNvPr id="209" name="Freeform 41">
+            <a:extLst>
+              <a:ext uri="{FF2B5EF4-FFF2-40B4-BE49-F238E27FC236}">
+                <a16:creationId xmlns:a16="http://schemas.microsoft.com/office/drawing/2014/main" id="{7FBA368A-55EB-364D-FF6E-69D74385CC45}"/>
+              </a:ext>
+            </a:extLst>
+          </p:cNvPr>
+          <p:cNvSpPr/>
+          <p:nvPr/>
+        </p:nvSpPr>
+        <p:spPr>
+          <a:xfrm>
+            <a:off x="7302807" y="3141043"/>
+            <a:ext cx="1083597" cy="1083597"/>
+          </a:xfrm>
+          <a:custGeom>
+            <a:avLst/>
+            <a:gdLst/>
+            <a:ahLst/>
+            <a:cxnLst/>
+            <a:rect l="l" t="t" r="r" b="b"/>
+            <a:pathLst>
+              <a:path w="2167194" h="2167194">
+                <a:moveTo>
+                  <a:pt x="0" y="0"/>
+                </a:moveTo>
+                <a:lnTo>
+                  <a:pt x="2167194" y="0"/>
+                </a:lnTo>
+                <a:lnTo>
+                  <a:pt x="2167194" y="2167194"/>
+                </a:lnTo>
+                <a:lnTo>
+                  <a:pt x="0" y="2167194"/>
+                </a:lnTo>
+                <a:lnTo>
+                  <a:pt x="0" y="0"/>
+                </a:lnTo>
+                <a:close/>
+              </a:path>
+            </a:pathLst>
+          </a:custGeom>
+          <a:blipFill>
+            <a:blip r:embed="rId14"/>
+            <a:stretch>
+              <a:fillRect/>
+            </a:stretch>
+          </a:blipFill>
+        </p:spPr>
+        <p:txBody>
+          <a:bodyPr/>
+          <a:lstStyle/>
+          <a:p>
+            <a:endParaRPr lang="pt-BR" sz="700"/>
+          </a:p>
+        </p:txBody>
+      </p:sp>
+      <p:sp>
+        <p:nvSpPr>
+          <p:cNvPr id="210" name="Freeform 42">
+            <a:extLst>
+              <a:ext uri="{FF2B5EF4-FFF2-40B4-BE49-F238E27FC236}">
+                <a16:creationId xmlns:a16="http://schemas.microsoft.com/office/drawing/2014/main" id="{7CAB6D2D-4958-EFD2-6DA3-617F8EFD1F31}"/>
+              </a:ext>
+            </a:extLst>
+          </p:cNvPr>
+          <p:cNvSpPr/>
+          <p:nvPr/>
+        </p:nvSpPr>
+        <p:spPr>
+          <a:xfrm rot="10799999">
+            <a:off x="6682079" y="2116565"/>
+            <a:ext cx="1034765" cy="1152067"/>
+          </a:xfrm>
+          <a:custGeom>
+            <a:avLst/>
+            <a:gdLst/>
+            <a:ahLst/>
+            <a:cxnLst/>
+            <a:rect l="l" t="t" r="r" b="b"/>
+            <a:pathLst>
+              <a:path w="2069530" h="2304133">
+                <a:moveTo>
+                  <a:pt x="0" y="0"/>
+                </a:moveTo>
+                <a:lnTo>
+                  <a:pt x="2069531" y="0"/>
+                </a:lnTo>
+                <a:lnTo>
+                  <a:pt x="2069531" y="2304133"/>
+                </a:lnTo>
+                <a:lnTo>
+                  <a:pt x="0" y="2304133"/>
+                </a:lnTo>
+                <a:lnTo>
+                  <a:pt x="0" y="0"/>
+                </a:lnTo>
+                <a:close/>
+              </a:path>
+            </a:pathLst>
+          </a:custGeom>
+          <a:blipFill>
+            <a:blip r:embed="rId15">
+              <a:extLst>
+                <a:ext uri="{96DAC541-7B7A-43D3-8B79-37D633B846F1}">
+                  <asvg:svgBlip xmlns:asvg="http://schemas.microsoft.com/office/drawing/2016/SVG/main" r:embed="rId16"/>
+                </a:ext>
+              </a:extLst>
+            </a:blip>
+            <a:stretch>
+              <a:fillRect/>
+            </a:stretch>
+          </a:blipFill>
+          <a:ln cap="sq">
+            <a:noFill/>
+            <a:prstDash val="dash"/>
+            <a:miter/>
+          </a:ln>
+        </p:spPr>
+        <p:txBody>
+          <a:bodyPr/>
+          <a:lstStyle/>
+          <a:p>
+            <a:endParaRPr lang="pt-BR" sz="700"/>
+          </a:p>
+        </p:txBody>
+      </p:sp>
+      <p:sp>
+        <p:nvSpPr>
+          <p:cNvPr id="211" name="TextBox 43">
+            <a:extLst>
+              <a:ext uri="{FF2B5EF4-FFF2-40B4-BE49-F238E27FC236}">
+                <a16:creationId xmlns:a16="http://schemas.microsoft.com/office/drawing/2014/main" id="{80C6CDB8-4837-4552-69A4-C8A740797D12}"/>
+              </a:ext>
+            </a:extLst>
+          </p:cNvPr>
+          <p:cNvSpPr txBox="1"/>
+          <p:nvPr/>
+        </p:nvSpPr>
+        <p:spPr>
+          <a:xfrm>
+            <a:off x="210725" y="3515896"/>
+            <a:ext cx="948184" cy="269433"/>
+          </a:xfrm>
+          <a:prstGeom prst="rect">
+            <a:avLst/>
+          </a:prstGeom>
+        </p:spPr>
+        <p:txBody>
+          <a:bodyPr lIns="0" tIns="0" rIns="0" bIns="0" rtlCol="0" anchor="t">
+            <a:spAutoFit/>
+          </a:bodyPr>
+          <a:lstStyle/>
+          <a:p>
+            <a:pPr algn="ctr">
+              <a:lnSpc>
+                <a:spcPts val="1083"/>
+              </a:lnSpc>
+            </a:pPr>
+            <a:r>
+              <a:rPr lang="en-US" sz="774">
+                <a:solidFill>
+                  <a:srgbClr val="006007"/>
+                </a:solidFill>
+                <a:latin typeface="Open Sans Bold"/>
+              </a:rPr>
+              <a:t>Sensor de Bloqueio (TRCT500)</a:t>
+            </a:r>
+          </a:p>
+        </p:txBody>
+      </p:sp>
+      <p:sp>
+        <p:nvSpPr>
+          <p:cNvPr id="212" name="TextBox 44">
+            <a:extLst>
+              <a:ext uri="{FF2B5EF4-FFF2-40B4-BE49-F238E27FC236}">
+                <a16:creationId xmlns:a16="http://schemas.microsoft.com/office/drawing/2014/main" id="{5C383BF5-2480-8BB6-9E99-00B051254E0F}"/>
+              </a:ext>
+            </a:extLst>
+          </p:cNvPr>
+          <p:cNvSpPr txBox="1"/>
+          <p:nvPr/>
+        </p:nvSpPr>
+        <p:spPr>
+          <a:xfrm>
+            <a:off x="210725" y="4324474"/>
+            <a:ext cx="2066233" cy="655885"/>
+          </a:xfrm>
+          <a:prstGeom prst="rect">
+            <a:avLst/>
+          </a:prstGeom>
+        </p:spPr>
+        <p:txBody>
+          <a:bodyPr lIns="0" tIns="0" rIns="0" bIns="0" rtlCol="0" anchor="t">
+            <a:spAutoFit/>
+          </a:bodyPr>
+          <a:lstStyle/>
+          <a:p>
+            <a:pPr algn="ctr">
+              <a:lnSpc>
+                <a:spcPts val="1300"/>
+              </a:lnSpc>
+            </a:pPr>
+            <a:r>
+              <a:rPr lang="en-US" sz="929">
+                <a:latin typeface="Open Sans"/>
+              </a:rPr>
+              <a:t>Sensor de bloqueio que avisa quando a lixeira está cheia, que é ligado a um arduino.</a:t>
+            </a:r>
+          </a:p>
+          <a:p>
+            <a:pPr algn="ctr">
+              <a:lnSpc>
+                <a:spcPts val="1300"/>
+              </a:lnSpc>
+            </a:pPr>
+            <a:endParaRPr lang="en-US" sz="929">
+              <a:latin typeface="Open Sans"/>
+            </a:endParaRPr>
+          </a:p>
+        </p:txBody>
+      </p:sp>
+      <p:sp>
+        <p:nvSpPr>
+          <p:cNvPr id="213" name="TextBox 45">
+            <a:extLst>
+              <a:ext uri="{FF2B5EF4-FFF2-40B4-BE49-F238E27FC236}">
+                <a16:creationId xmlns:a16="http://schemas.microsoft.com/office/drawing/2014/main" id="{37BB9AC2-7EB5-FBCB-81F5-2C1AAA4814EA}"/>
+              </a:ext>
+            </a:extLst>
+          </p:cNvPr>
+          <p:cNvSpPr txBox="1"/>
+          <p:nvPr/>
+        </p:nvSpPr>
+        <p:spPr>
+          <a:xfrm>
+            <a:off x="323241" y="1151783"/>
+            <a:ext cx="1212027" cy="489173"/>
+          </a:xfrm>
+          <a:prstGeom prst="rect">
+            <a:avLst/>
+          </a:prstGeom>
+        </p:spPr>
+        <p:txBody>
+          <a:bodyPr lIns="0" tIns="0" rIns="0" bIns="0" rtlCol="0" anchor="t">
+            <a:spAutoFit/>
+          </a:bodyPr>
+          <a:lstStyle/>
+          <a:p>
+            <a:pPr algn="ctr">
+              <a:lnSpc>
+                <a:spcPts val="1300"/>
+              </a:lnSpc>
+            </a:pPr>
+            <a:r>
+              <a:rPr lang="en-US" sz="929">
+                <a:latin typeface="Open Sans"/>
+              </a:rPr>
+              <a:t>API Dat Acqu Ino - para inserção de dados</a:t>
+            </a:r>
+          </a:p>
+        </p:txBody>
+      </p:sp>
+      <p:sp>
+        <p:nvSpPr>
+          <p:cNvPr id="214" name="TextBox 46">
+            <a:extLst>
+              <a:ext uri="{FF2B5EF4-FFF2-40B4-BE49-F238E27FC236}">
+                <a16:creationId xmlns:a16="http://schemas.microsoft.com/office/drawing/2014/main" id="{1383BD7E-2F9E-4F98-FC7E-61B6B9E5B1D6}"/>
+              </a:ext>
+            </a:extLst>
+          </p:cNvPr>
+          <p:cNvSpPr txBox="1"/>
+          <p:nvPr/>
+        </p:nvSpPr>
+        <p:spPr>
+          <a:xfrm>
+            <a:off x="2292916" y="2016059"/>
+            <a:ext cx="1429044" cy="322461"/>
+          </a:xfrm>
+          <a:prstGeom prst="rect">
+            <a:avLst/>
+          </a:prstGeom>
+        </p:spPr>
+        <p:txBody>
+          <a:bodyPr lIns="0" tIns="0" rIns="0" bIns="0" rtlCol="0" anchor="t">
+            <a:spAutoFit/>
+          </a:bodyPr>
+          <a:lstStyle/>
+          <a:p>
+            <a:pPr algn="ctr">
+              <a:lnSpc>
+                <a:spcPts val="1300"/>
+              </a:lnSpc>
+            </a:pPr>
+            <a:r>
+              <a:rPr lang="en-US" sz="929">
+                <a:latin typeface="Open Sans"/>
+              </a:rPr>
+              <a:t>Conectando pela porta de abertura de conexão.</a:t>
+            </a:r>
+          </a:p>
+        </p:txBody>
+      </p:sp>
+      <p:sp>
+        <p:nvSpPr>
+          <p:cNvPr id="215" name="TextBox 47">
+            <a:extLst>
+              <a:ext uri="{FF2B5EF4-FFF2-40B4-BE49-F238E27FC236}">
+                <a16:creationId xmlns:a16="http://schemas.microsoft.com/office/drawing/2014/main" id="{47CFDE93-390B-FC5F-5C63-2F139CA4BB43}"/>
+              </a:ext>
+            </a:extLst>
+          </p:cNvPr>
+          <p:cNvSpPr txBox="1"/>
+          <p:nvPr/>
+        </p:nvSpPr>
+        <p:spPr>
+          <a:xfrm>
+            <a:off x="4644331" y="302075"/>
+            <a:ext cx="1140932" cy="163250"/>
+          </a:xfrm>
+          <a:prstGeom prst="rect">
+            <a:avLst/>
+          </a:prstGeom>
+        </p:spPr>
+        <p:txBody>
+          <a:bodyPr lIns="0" tIns="0" rIns="0" bIns="0" rtlCol="0" anchor="t">
+            <a:spAutoFit/>
+          </a:bodyPr>
+          <a:lstStyle/>
+          <a:p>
+            <a:pPr algn="ctr">
+              <a:lnSpc>
+                <a:spcPts val="1372"/>
+              </a:lnSpc>
+            </a:pPr>
+            <a:r>
+              <a:rPr lang="en-US" sz="980">
+                <a:solidFill>
+                  <a:srgbClr val="006007"/>
+                </a:solidFill>
+                <a:latin typeface="Open Sans Bold"/>
+              </a:rPr>
+              <a:t>Máquina Virtual</a:t>
+            </a:r>
+          </a:p>
+        </p:txBody>
+      </p:sp>
+      <p:sp>
+        <p:nvSpPr>
+          <p:cNvPr id="216" name="TextBox 48">
+            <a:extLst>
+              <a:ext uri="{FF2B5EF4-FFF2-40B4-BE49-F238E27FC236}">
+                <a16:creationId xmlns:a16="http://schemas.microsoft.com/office/drawing/2014/main" id="{AAA5E57D-D036-70E2-79ED-329DEB418C37}"/>
+              </a:ext>
+            </a:extLst>
+          </p:cNvPr>
+          <p:cNvSpPr txBox="1"/>
+          <p:nvPr/>
+        </p:nvSpPr>
+        <p:spPr>
+          <a:xfrm>
+            <a:off x="4396223" y="453927"/>
+            <a:ext cx="1637149" cy="489173"/>
+          </a:xfrm>
+          <a:prstGeom prst="rect">
+            <a:avLst/>
+          </a:prstGeom>
+        </p:spPr>
+        <p:txBody>
+          <a:bodyPr lIns="0" tIns="0" rIns="0" bIns="0" rtlCol="0" anchor="t">
+            <a:spAutoFit/>
+          </a:bodyPr>
+          <a:lstStyle/>
+          <a:p>
+            <a:pPr algn="ctr">
+              <a:lnSpc>
+                <a:spcPts val="1300"/>
+              </a:lnSpc>
+            </a:pPr>
+            <a:r>
+              <a:rPr lang="en-US" sz="929" dirty="0" err="1">
+                <a:latin typeface="Open Sans"/>
+              </a:rPr>
+              <a:t>Armazena</a:t>
+            </a:r>
+            <a:r>
+              <a:rPr lang="en-US" sz="929" dirty="0">
+                <a:latin typeface="Open Sans"/>
+              </a:rPr>
+              <a:t> </a:t>
+            </a:r>
+            <a:r>
+              <a:rPr lang="en-US" sz="929" dirty="0" err="1">
+                <a:latin typeface="Open Sans"/>
+              </a:rPr>
+              <a:t>os</a:t>
+            </a:r>
+            <a:r>
+              <a:rPr lang="en-US" sz="929" dirty="0">
+                <a:latin typeface="Open Sans"/>
+              </a:rPr>
+              <a:t> dados no MySQL Server</a:t>
+            </a:r>
+          </a:p>
+          <a:p>
+            <a:pPr algn="ctr">
+              <a:lnSpc>
+                <a:spcPts val="1300"/>
+              </a:lnSpc>
+            </a:pPr>
+            <a:r>
+              <a:rPr lang="en-US" sz="929" dirty="0">
+                <a:latin typeface="Open Sans"/>
+              </a:rPr>
+              <a:t>que </a:t>
+            </a:r>
+            <a:r>
+              <a:rPr lang="en-US" sz="929" dirty="0" err="1">
+                <a:latin typeface="Open Sans"/>
+              </a:rPr>
+              <a:t>foram</a:t>
+            </a:r>
+            <a:r>
+              <a:rPr lang="en-US" sz="929" dirty="0">
+                <a:latin typeface="Open Sans"/>
+              </a:rPr>
+              <a:t> </a:t>
+            </a:r>
+            <a:r>
+              <a:rPr lang="en-US" sz="929" dirty="0" err="1">
+                <a:latin typeface="Open Sans"/>
+              </a:rPr>
+              <a:t>tirados</a:t>
+            </a:r>
+            <a:r>
+              <a:rPr lang="en-US" sz="929" dirty="0">
+                <a:latin typeface="Open Sans"/>
+              </a:rPr>
+              <a:t> do Sensor.</a:t>
+            </a:r>
+          </a:p>
+        </p:txBody>
+      </p:sp>
+      <p:sp>
+        <p:nvSpPr>
+          <p:cNvPr id="217" name="TextBox 49">
+            <a:extLst>
+              <a:ext uri="{FF2B5EF4-FFF2-40B4-BE49-F238E27FC236}">
+                <a16:creationId xmlns:a16="http://schemas.microsoft.com/office/drawing/2014/main" id="{443C5D82-C8B8-F1F1-731A-0F9B1F826E3D}"/>
+              </a:ext>
+            </a:extLst>
+          </p:cNvPr>
+          <p:cNvSpPr txBox="1"/>
+          <p:nvPr/>
+        </p:nvSpPr>
+        <p:spPr>
+          <a:xfrm>
+            <a:off x="3121802" y="294929"/>
+            <a:ext cx="1082626" cy="163250"/>
+          </a:xfrm>
+          <a:prstGeom prst="rect">
+            <a:avLst/>
+          </a:prstGeom>
+        </p:spPr>
+        <p:txBody>
+          <a:bodyPr lIns="0" tIns="0" rIns="0" bIns="0" rtlCol="0" anchor="t">
+            <a:spAutoFit/>
+          </a:bodyPr>
+          <a:lstStyle/>
+          <a:p>
+            <a:pPr algn="ctr">
+              <a:lnSpc>
+                <a:spcPts val="1372"/>
+              </a:lnSpc>
+            </a:pPr>
+            <a:r>
+              <a:rPr lang="en-US" sz="980" dirty="0">
+                <a:solidFill>
+                  <a:srgbClr val="006007"/>
+                </a:solidFill>
+                <a:latin typeface="Open Sans Bold"/>
+              </a:rPr>
+              <a:t>API com NodeJS</a:t>
+            </a:r>
+          </a:p>
+        </p:txBody>
+      </p:sp>
+      <p:sp>
+        <p:nvSpPr>
+          <p:cNvPr id="218" name="TextBox 50">
+            <a:extLst>
+              <a:ext uri="{FF2B5EF4-FFF2-40B4-BE49-F238E27FC236}">
+                <a16:creationId xmlns:a16="http://schemas.microsoft.com/office/drawing/2014/main" id="{A0628A51-202C-D9AE-0AA6-9C93DE375ACB}"/>
+              </a:ext>
+            </a:extLst>
+          </p:cNvPr>
+          <p:cNvSpPr txBox="1"/>
+          <p:nvPr/>
+        </p:nvSpPr>
+        <p:spPr>
+          <a:xfrm>
+            <a:off x="3043715" y="453927"/>
+            <a:ext cx="1356491" cy="489173"/>
+          </a:xfrm>
+          <a:prstGeom prst="rect">
+            <a:avLst/>
+          </a:prstGeom>
+        </p:spPr>
+        <p:txBody>
+          <a:bodyPr lIns="0" tIns="0" rIns="0" bIns="0" rtlCol="0" anchor="t">
+            <a:spAutoFit/>
+          </a:bodyPr>
+          <a:lstStyle/>
+          <a:p>
+            <a:pPr algn="ctr">
+              <a:lnSpc>
+                <a:spcPts val="1300"/>
+              </a:lnSpc>
+            </a:pPr>
+            <a:r>
+              <a:rPr lang="en-US" sz="929" dirty="0" err="1">
+                <a:latin typeface="Open Sans"/>
+              </a:rPr>
+              <a:t>Recebe</a:t>
+            </a:r>
+            <a:r>
+              <a:rPr lang="en-US" sz="929" dirty="0">
+                <a:latin typeface="Open Sans"/>
+              </a:rPr>
+              <a:t> </a:t>
+            </a:r>
+            <a:r>
+              <a:rPr lang="en-US" sz="929" dirty="0" err="1">
+                <a:latin typeface="Open Sans"/>
+              </a:rPr>
+              <a:t>os</a:t>
+            </a:r>
+            <a:r>
+              <a:rPr lang="en-US" sz="929" dirty="0">
+                <a:latin typeface="Open Sans"/>
+              </a:rPr>
+              <a:t> dados </a:t>
+            </a:r>
+            <a:r>
+              <a:rPr lang="en-US" sz="929" dirty="0" err="1">
+                <a:latin typeface="Open Sans"/>
+              </a:rPr>
+              <a:t>gerados</a:t>
+            </a:r>
+            <a:r>
+              <a:rPr lang="en-US" sz="929" dirty="0">
+                <a:latin typeface="Open Sans"/>
+              </a:rPr>
+              <a:t> </a:t>
+            </a:r>
+            <a:r>
+              <a:rPr lang="en-US" sz="929" dirty="0" err="1">
+                <a:latin typeface="Open Sans"/>
+              </a:rPr>
+              <a:t>pelo</a:t>
+            </a:r>
+            <a:r>
+              <a:rPr lang="en-US" sz="929" dirty="0">
+                <a:latin typeface="Open Sans"/>
+              </a:rPr>
+              <a:t> sensor </a:t>
+            </a:r>
+            <a:r>
+              <a:rPr lang="en-US" sz="929" dirty="0" err="1">
+                <a:latin typeface="Open Sans"/>
+              </a:rPr>
+              <a:t>instalado</a:t>
+            </a:r>
+            <a:r>
+              <a:rPr lang="en-US" sz="929" dirty="0">
+                <a:latin typeface="Open Sans"/>
+              </a:rPr>
+              <a:t> </a:t>
+            </a:r>
+            <a:r>
+              <a:rPr lang="en-US" sz="929" dirty="0" err="1">
+                <a:latin typeface="Open Sans"/>
+              </a:rPr>
+              <a:t>nas</a:t>
+            </a:r>
+            <a:r>
+              <a:rPr lang="en-US" sz="929" dirty="0">
+                <a:latin typeface="Open Sans"/>
+              </a:rPr>
+              <a:t> </a:t>
+            </a:r>
+            <a:r>
+              <a:rPr lang="en-US" sz="929" dirty="0" err="1">
+                <a:latin typeface="Open Sans"/>
+              </a:rPr>
+              <a:t>lixeiras</a:t>
+            </a:r>
+            <a:r>
+              <a:rPr lang="en-US" sz="929" dirty="0">
+                <a:latin typeface="Open Sans"/>
+              </a:rPr>
+              <a:t> </a:t>
+            </a:r>
+          </a:p>
+        </p:txBody>
+      </p:sp>
+      <p:sp>
+        <p:nvSpPr>
+          <p:cNvPr id="219" name="TextBox 51">
+            <a:extLst>
+              <a:ext uri="{FF2B5EF4-FFF2-40B4-BE49-F238E27FC236}">
+                <a16:creationId xmlns:a16="http://schemas.microsoft.com/office/drawing/2014/main" id="{853610D1-BB69-8886-1DFE-C6AD3E965C64}"/>
+              </a:ext>
+            </a:extLst>
+          </p:cNvPr>
+          <p:cNvSpPr txBox="1"/>
+          <p:nvPr/>
+        </p:nvSpPr>
+        <p:spPr>
+          <a:xfrm>
+            <a:off x="3856306" y="991986"/>
+            <a:ext cx="958119" cy="163250"/>
+          </a:xfrm>
+          <a:prstGeom prst="rect">
+            <a:avLst/>
+          </a:prstGeom>
+        </p:spPr>
+        <p:txBody>
+          <a:bodyPr lIns="0" tIns="0" rIns="0" bIns="0" rtlCol="0" anchor="t">
+            <a:spAutoFit/>
+          </a:bodyPr>
+          <a:lstStyle/>
+          <a:p>
+            <a:pPr algn="ctr">
+              <a:lnSpc>
+                <a:spcPts val="1372"/>
+              </a:lnSpc>
+            </a:pPr>
+            <a:r>
+              <a:rPr lang="en-US" sz="980">
+                <a:solidFill>
+                  <a:srgbClr val="006007"/>
+                </a:solidFill>
+                <a:latin typeface="Open Sans Bold"/>
+              </a:rPr>
+              <a:t>Acesso do S.O</a:t>
+            </a:r>
+          </a:p>
+        </p:txBody>
+      </p:sp>
+      <p:sp>
+        <p:nvSpPr>
+          <p:cNvPr id="220" name="TextBox 52">
+            <a:extLst>
+              <a:ext uri="{FF2B5EF4-FFF2-40B4-BE49-F238E27FC236}">
+                <a16:creationId xmlns:a16="http://schemas.microsoft.com/office/drawing/2014/main" id="{263F9E41-4AFA-720E-B60C-4DE2B912C6C9}"/>
+              </a:ext>
+            </a:extLst>
+          </p:cNvPr>
+          <p:cNvSpPr txBox="1"/>
+          <p:nvPr/>
+        </p:nvSpPr>
+        <p:spPr>
+          <a:xfrm>
+            <a:off x="3533888" y="1131622"/>
+            <a:ext cx="1753492" cy="489173"/>
+          </a:xfrm>
+          <a:prstGeom prst="rect">
+            <a:avLst/>
+          </a:prstGeom>
+        </p:spPr>
+        <p:txBody>
+          <a:bodyPr lIns="0" tIns="0" rIns="0" bIns="0" rtlCol="0" anchor="t">
+            <a:spAutoFit/>
+          </a:bodyPr>
+          <a:lstStyle/>
+          <a:p>
+            <a:pPr algn="ctr">
+              <a:lnSpc>
+                <a:spcPts val="1300"/>
+              </a:lnSpc>
+            </a:pPr>
+            <a:r>
+              <a:rPr lang="en-US" sz="929">
+                <a:latin typeface="Open Sans"/>
+              </a:rPr>
+              <a:t>Através do usuário Host (Windows) acessa a VM, onde acessa o SO guest (Linux).</a:t>
+            </a:r>
+          </a:p>
+        </p:txBody>
+      </p:sp>
+      <p:sp>
+        <p:nvSpPr>
+          <p:cNvPr id="221" name="TextBox 53">
+            <a:extLst>
+              <a:ext uri="{FF2B5EF4-FFF2-40B4-BE49-F238E27FC236}">
+                <a16:creationId xmlns:a16="http://schemas.microsoft.com/office/drawing/2014/main" id="{F625EF46-0B17-09B2-7F30-A3B9AEB960ED}"/>
+              </a:ext>
+            </a:extLst>
+          </p:cNvPr>
+          <p:cNvSpPr txBox="1"/>
+          <p:nvPr/>
+        </p:nvSpPr>
+        <p:spPr>
+          <a:xfrm>
+            <a:off x="4964249" y="1712482"/>
+            <a:ext cx="1931261" cy="163250"/>
+          </a:xfrm>
+          <a:prstGeom prst="rect">
+            <a:avLst/>
+          </a:prstGeom>
+        </p:spPr>
+        <p:txBody>
+          <a:bodyPr lIns="0" tIns="0" rIns="0" bIns="0" rtlCol="0" anchor="t">
+            <a:spAutoFit/>
+          </a:bodyPr>
+          <a:lstStyle/>
+          <a:p>
+            <a:pPr algn="ctr">
+              <a:lnSpc>
+                <a:spcPts val="1372"/>
+              </a:lnSpc>
+            </a:pPr>
+            <a:r>
+              <a:rPr lang="en-US" sz="980">
+                <a:solidFill>
+                  <a:srgbClr val="006007"/>
+                </a:solidFill>
+                <a:latin typeface="Open Sans Bold"/>
+              </a:rPr>
+              <a:t>Aplicação Web</a:t>
+            </a:r>
+          </a:p>
+        </p:txBody>
+      </p:sp>
+      <p:sp>
+        <p:nvSpPr>
+          <p:cNvPr id="222" name="TextBox 54">
+            <a:extLst>
+              <a:ext uri="{FF2B5EF4-FFF2-40B4-BE49-F238E27FC236}">
+                <a16:creationId xmlns:a16="http://schemas.microsoft.com/office/drawing/2014/main" id="{F5D798ED-BE15-C56D-28EA-53667987DF5E}"/>
+              </a:ext>
+            </a:extLst>
+          </p:cNvPr>
+          <p:cNvSpPr txBox="1"/>
+          <p:nvPr/>
+        </p:nvSpPr>
+        <p:spPr>
+          <a:xfrm>
+            <a:off x="7403773" y="4029861"/>
+            <a:ext cx="881666" cy="210507"/>
+          </a:xfrm>
+          <a:prstGeom prst="rect">
+            <a:avLst/>
+          </a:prstGeom>
+        </p:spPr>
+        <p:txBody>
+          <a:bodyPr lIns="0" tIns="0" rIns="0" bIns="0" rtlCol="0" anchor="t">
+            <a:spAutoFit/>
+          </a:bodyPr>
+          <a:lstStyle/>
+          <a:p>
+            <a:pPr algn="ctr">
+              <a:lnSpc>
+                <a:spcPts val="1795"/>
+              </a:lnSpc>
+            </a:pPr>
+            <a:r>
+              <a:rPr lang="en-US" sz="1282">
+                <a:solidFill>
+                  <a:srgbClr val="006007"/>
+                </a:solidFill>
+                <a:latin typeface="Open Sans Bold"/>
+              </a:rPr>
+              <a:t>Cliente</a:t>
+            </a:r>
+          </a:p>
+        </p:txBody>
+      </p:sp>
+      <p:sp>
+        <p:nvSpPr>
+          <p:cNvPr id="223" name="TextBox 55">
+            <a:extLst>
+              <a:ext uri="{FF2B5EF4-FFF2-40B4-BE49-F238E27FC236}">
+                <a16:creationId xmlns:a16="http://schemas.microsoft.com/office/drawing/2014/main" id="{5416AA23-8221-3711-7E8D-6F8C3B987E09}"/>
+              </a:ext>
+            </a:extLst>
+          </p:cNvPr>
+          <p:cNvSpPr txBox="1"/>
+          <p:nvPr/>
+        </p:nvSpPr>
+        <p:spPr>
+          <a:xfrm>
+            <a:off x="7637601" y="2128051"/>
+            <a:ext cx="1295674" cy="489173"/>
+          </a:xfrm>
+          <a:prstGeom prst="rect">
+            <a:avLst/>
+          </a:prstGeom>
+        </p:spPr>
+        <p:txBody>
+          <a:bodyPr lIns="0" tIns="0" rIns="0" bIns="0" rtlCol="0" anchor="t">
+            <a:spAutoFit/>
+          </a:bodyPr>
+          <a:lstStyle/>
+          <a:p>
+            <a:pPr algn="ctr">
+              <a:lnSpc>
+                <a:spcPts val="1300"/>
+              </a:lnSpc>
+            </a:pPr>
+            <a:r>
+              <a:rPr lang="en-US" sz="929">
+                <a:latin typeface="Open Sans"/>
+              </a:rPr>
+              <a:t>Acessa o Site institucional através de navegadores Web;</a:t>
+            </a:r>
+          </a:p>
+        </p:txBody>
+      </p:sp>
+      <p:sp>
+        <p:nvSpPr>
+          <p:cNvPr id="224" name="TextBox 56">
+            <a:extLst>
+              <a:ext uri="{FF2B5EF4-FFF2-40B4-BE49-F238E27FC236}">
+                <a16:creationId xmlns:a16="http://schemas.microsoft.com/office/drawing/2014/main" id="{3C1DCD03-58CE-89CA-E1F3-13B594445F12}"/>
+              </a:ext>
+            </a:extLst>
+          </p:cNvPr>
+          <p:cNvSpPr txBox="1"/>
+          <p:nvPr/>
+        </p:nvSpPr>
+        <p:spPr>
+          <a:xfrm>
+            <a:off x="1820319" y="3056094"/>
+            <a:ext cx="1989114" cy="489173"/>
+          </a:xfrm>
+          <a:prstGeom prst="rect">
+            <a:avLst/>
+          </a:prstGeom>
+        </p:spPr>
+        <p:txBody>
+          <a:bodyPr lIns="0" tIns="0" rIns="0" bIns="0" rtlCol="0" anchor="t">
+            <a:spAutoFit/>
+          </a:bodyPr>
+          <a:lstStyle/>
+          <a:p>
+            <a:pPr algn="ctr">
+              <a:lnSpc>
+                <a:spcPts val="1300"/>
+              </a:lnSpc>
+            </a:pPr>
+            <a:r>
+              <a:rPr lang="en-US" sz="929">
+                <a:latin typeface="Open Sans"/>
+              </a:rPr>
+              <a:t>Arduino é ligado a máquina local via cabo USB armazenando os dados captados pelo sensor.</a:t>
             </a:r>
           </a:p>
         </p:txBody>

</xml_diff>